<commit_message>
Added few photos from the home lab setup
</commit_message>
<xml_diff>
--- a/materials/design-files.pptx
+++ b/materials/design-files.pptx
@@ -4,8 +4,13 @@
   <p:sldMasterIdLst>
     <p:sldMasterId id="2147483648" r:id="rId1"/>
   </p:sldMasterIdLst>
+  <p:notesMasterIdLst>
+    <p:notesMasterId r:id="rId5"/>
+  </p:notesMasterIdLst>
   <p:sldIdLst>
     <p:sldId id="256" r:id="rId2"/>
+    <p:sldId id="257" r:id="rId3"/>
+    <p:sldId id="258" r:id="rId4"/>
   </p:sldIdLst>
   <p:sldSz cx="12192000" cy="6858000"/>
   <p:notesSz cx="6858000" cy="9144000"/>
@@ -104,7 +109,361 @@
       </a:defRPr>
     </a:lvl9pPr>
   </p:defaultTextStyle>
+  <p:extLst>
+    <p:ext uri="{EFAFB233-063F-42B5-8137-9DF3F51BA10A}">
+      <p15:sldGuideLst xmlns:p15="http://schemas.microsoft.com/office/powerpoint/2012/main"/>
+    </p:ext>
+  </p:extLst>
 </p:presentation>
+</file>
+
+<file path=ppt/notesMasters/notesMaster1.xml><?xml version="1.0" encoding="utf-8"?>
+<p:notesMaster xmlns:a="http://schemas.openxmlformats.org/drawingml/2006/main" xmlns:r="http://schemas.openxmlformats.org/officeDocument/2006/relationships" xmlns:p="http://schemas.openxmlformats.org/presentationml/2006/main">
+  <p:cSld>
+    <p:bg>
+      <p:bgRef idx="1001">
+        <a:schemeClr val="bg1"/>
+      </p:bgRef>
+    </p:bg>
+    <p:spTree>
+      <p:nvGrpSpPr>
+        <p:cNvPr id="1" name=""/>
+        <p:cNvGrpSpPr/>
+        <p:nvPr/>
+      </p:nvGrpSpPr>
+      <p:grpSpPr>
+        <a:xfrm>
+          <a:off x="0" y="0"/>
+          <a:ext cx="0" cy="0"/>
+          <a:chOff x="0" y="0"/>
+          <a:chExt cx="0" cy="0"/>
+        </a:xfrm>
+      </p:grpSpPr>
+      <p:sp>
+        <p:nvSpPr>
+          <p:cNvPr id="2" name="Header Placeholder 1"/>
+          <p:cNvSpPr>
+            <a:spLocks noGrp="1"/>
+          </p:cNvSpPr>
+          <p:nvPr>
+            <p:ph type="hdr" sz="quarter"/>
+          </p:nvPr>
+        </p:nvSpPr>
+        <p:spPr>
+          <a:xfrm>
+            <a:off x="0" y="0"/>
+            <a:ext cx="2971800" cy="458788"/>
+          </a:xfrm>
+          <a:prstGeom prst="rect">
+            <a:avLst/>
+          </a:prstGeom>
+        </p:spPr>
+        <p:txBody>
+          <a:bodyPr vert="horz" lIns="91440" tIns="45720" rIns="91440" bIns="45720" rtlCol="0"/>
+          <a:lstStyle>
+            <a:lvl1pPr algn="l">
+              <a:defRPr sz="1200"/>
+            </a:lvl1pPr>
+          </a:lstStyle>
+          <a:p>
+            <a:endParaRPr lang="en-US"/>
+          </a:p>
+        </p:txBody>
+      </p:sp>
+      <p:sp>
+        <p:nvSpPr>
+          <p:cNvPr id="3" name="Date Placeholder 2"/>
+          <p:cNvSpPr>
+            <a:spLocks noGrp="1"/>
+          </p:cNvSpPr>
+          <p:nvPr>
+            <p:ph type="dt" idx="1"/>
+          </p:nvPr>
+        </p:nvSpPr>
+        <p:spPr>
+          <a:xfrm>
+            <a:off x="3884613" y="0"/>
+            <a:ext cx="2971800" cy="458788"/>
+          </a:xfrm>
+          <a:prstGeom prst="rect">
+            <a:avLst/>
+          </a:prstGeom>
+        </p:spPr>
+        <p:txBody>
+          <a:bodyPr vert="horz" lIns="91440" tIns="45720" rIns="91440" bIns="45720" rtlCol="0"/>
+          <a:lstStyle>
+            <a:lvl1pPr algn="r">
+              <a:defRPr sz="1200"/>
+            </a:lvl1pPr>
+          </a:lstStyle>
+          <a:p>
+            <a:fld id="{3C63A29E-75E5-45A1-84FC-65405F55D041}" type="datetimeFigureOut">
+              <a:rPr lang="en-US" smtClean="0"/>
+              <a:t>1/15/2026</a:t>
+            </a:fld>
+            <a:endParaRPr lang="en-US"/>
+          </a:p>
+        </p:txBody>
+      </p:sp>
+      <p:sp>
+        <p:nvSpPr>
+          <p:cNvPr id="4" name="Slide Image Placeholder 3"/>
+          <p:cNvSpPr>
+            <a:spLocks noGrp="1" noRot="1" noChangeAspect="1"/>
+          </p:cNvSpPr>
+          <p:nvPr>
+            <p:ph type="sldImg" idx="2"/>
+          </p:nvPr>
+        </p:nvSpPr>
+        <p:spPr>
+          <a:xfrm>
+            <a:off x="685800" y="1143000"/>
+            <a:ext cx="5486400" cy="3086100"/>
+          </a:xfrm>
+          <a:prstGeom prst="rect">
+            <a:avLst/>
+          </a:prstGeom>
+          <a:noFill/>
+          <a:ln w="12700">
+            <a:solidFill>
+              <a:prstClr val="black"/>
+            </a:solidFill>
+          </a:ln>
+        </p:spPr>
+        <p:txBody>
+          <a:bodyPr vert="horz" lIns="91440" tIns="45720" rIns="91440" bIns="45720" rtlCol="0" anchor="ctr"/>
+          <a:lstStyle/>
+          <a:p>
+            <a:endParaRPr lang="en-US"/>
+          </a:p>
+        </p:txBody>
+      </p:sp>
+      <p:sp>
+        <p:nvSpPr>
+          <p:cNvPr id="5" name="Notes Placeholder 4"/>
+          <p:cNvSpPr>
+            <a:spLocks noGrp="1"/>
+          </p:cNvSpPr>
+          <p:nvPr>
+            <p:ph type="body" sz="quarter" idx="3"/>
+          </p:nvPr>
+        </p:nvSpPr>
+        <p:spPr>
+          <a:xfrm>
+            <a:off x="685800" y="4400550"/>
+            <a:ext cx="5486400" cy="3600450"/>
+          </a:xfrm>
+          <a:prstGeom prst="rect">
+            <a:avLst/>
+          </a:prstGeom>
+        </p:spPr>
+        <p:txBody>
+          <a:bodyPr vert="horz" lIns="91440" tIns="45720" rIns="91440" bIns="45720" rtlCol="0"/>
+          <a:lstStyle/>
+          <a:p>
+            <a:pPr lvl="0"/>
+            <a:r>
+              <a:rPr lang="en-US"/>
+              <a:t>Click to edit Master text styles</a:t>
+            </a:r>
+          </a:p>
+          <a:p>
+            <a:pPr lvl="1"/>
+            <a:r>
+              <a:rPr lang="en-US"/>
+              <a:t>Second level</a:t>
+            </a:r>
+          </a:p>
+          <a:p>
+            <a:pPr lvl="2"/>
+            <a:r>
+              <a:rPr lang="en-US"/>
+              <a:t>Third level</a:t>
+            </a:r>
+          </a:p>
+          <a:p>
+            <a:pPr lvl="3"/>
+            <a:r>
+              <a:rPr lang="en-US"/>
+              <a:t>Fourth level</a:t>
+            </a:r>
+          </a:p>
+          <a:p>
+            <a:pPr lvl="4"/>
+            <a:r>
+              <a:rPr lang="en-US"/>
+              <a:t>Fifth level</a:t>
+            </a:r>
+          </a:p>
+        </p:txBody>
+      </p:sp>
+      <p:sp>
+        <p:nvSpPr>
+          <p:cNvPr id="6" name="Footer Placeholder 5"/>
+          <p:cNvSpPr>
+            <a:spLocks noGrp="1"/>
+          </p:cNvSpPr>
+          <p:nvPr>
+            <p:ph type="ftr" sz="quarter" idx="4"/>
+          </p:nvPr>
+        </p:nvSpPr>
+        <p:spPr>
+          <a:xfrm>
+            <a:off x="0" y="8685213"/>
+            <a:ext cx="2971800" cy="458787"/>
+          </a:xfrm>
+          <a:prstGeom prst="rect">
+            <a:avLst/>
+          </a:prstGeom>
+        </p:spPr>
+        <p:txBody>
+          <a:bodyPr vert="horz" lIns="91440" tIns="45720" rIns="91440" bIns="45720" rtlCol="0" anchor="b"/>
+          <a:lstStyle>
+            <a:lvl1pPr algn="l">
+              <a:defRPr sz="1200"/>
+            </a:lvl1pPr>
+          </a:lstStyle>
+          <a:p>
+            <a:endParaRPr lang="en-US"/>
+          </a:p>
+        </p:txBody>
+      </p:sp>
+      <p:sp>
+        <p:nvSpPr>
+          <p:cNvPr id="7" name="Slide Number Placeholder 6"/>
+          <p:cNvSpPr>
+            <a:spLocks noGrp="1"/>
+          </p:cNvSpPr>
+          <p:nvPr>
+            <p:ph type="sldNum" sz="quarter" idx="5"/>
+          </p:nvPr>
+        </p:nvSpPr>
+        <p:spPr>
+          <a:xfrm>
+            <a:off x="3884613" y="8685213"/>
+            <a:ext cx="2971800" cy="458787"/>
+          </a:xfrm>
+          <a:prstGeom prst="rect">
+            <a:avLst/>
+          </a:prstGeom>
+        </p:spPr>
+        <p:txBody>
+          <a:bodyPr vert="horz" lIns="91440" tIns="45720" rIns="91440" bIns="45720" rtlCol="0" anchor="b"/>
+          <a:lstStyle>
+            <a:lvl1pPr algn="r">
+              <a:defRPr sz="1200"/>
+            </a:lvl1pPr>
+          </a:lstStyle>
+          <a:p>
+            <a:fld id="{BDABDE86-F41E-440C-A421-74AFAAA8CE79}" type="slidenum">
+              <a:rPr lang="en-US" smtClean="0"/>
+              <a:t>‹#›</a:t>
+            </a:fld>
+            <a:endParaRPr lang="en-US"/>
+          </a:p>
+        </p:txBody>
+      </p:sp>
+    </p:spTree>
+    <p:extLst>
+      <p:ext uri="{BB962C8B-B14F-4D97-AF65-F5344CB8AC3E}">
+        <p14:creationId xmlns:p14="http://schemas.microsoft.com/office/powerpoint/2010/main" val="1745244747"/>
+      </p:ext>
+    </p:extLst>
+  </p:cSld>
+  <p:clrMap bg1="lt1" tx1="dk1" bg2="lt2" tx2="dk2" accent1="accent1" accent2="accent2" accent3="accent3" accent4="accent4" accent5="accent5" accent6="accent6" hlink="hlink" folHlink="folHlink"/>
+  <p:notesStyle>
+    <a:lvl1pPr marL="0" algn="l" defTabSz="914400" rtl="0" eaLnBrk="1" latinLnBrk="0" hangingPunct="1">
+      <a:defRPr sz="1200" kern="1200">
+        <a:solidFill>
+          <a:schemeClr val="tx1"/>
+        </a:solidFill>
+        <a:latin typeface="+mn-lt"/>
+        <a:ea typeface="+mn-ea"/>
+        <a:cs typeface="+mn-cs"/>
+      </a:defRPr>
+    </a:lvl1pPr>
+    <a:lvl2pPr marL="457200" algn="l" defTabSz="914400" rtl="0" eaLnBrk="1" latinLnBrk="0" hangingPunct="1">
+      <a:defRPr sz="1200" kern="1200">
+        <a:solidFill>
+          <a:schemeClr val="tx1"/>
+        </a:solidFill>
+        <a:latin typeface="+mn-lt"/>
+        <a:ea typeface="+mn-ea"/>
+        <a:cs typeface="+mn-cs"/>
+      </a:defRPr>
+    </a:lvl2pPr>
+    <a:lvl3pPr marL="914400" algn="l" defTabSz="914400" rtl="0" eaLnBrk="1" latinLnBrk="0" hangingPunct="1">
+      <a:defRPr sz="1200" kern="1200">
+        <a:solidFill>
+          <a:schemeClr val="tx1"/>
+        </a:solidFill>
+        <a:latin typeface="+mn-lt"/>
+        <a:ea typeface="+mn-ea"/>
+        <a:cs typeface="+mn-cs"/>
+      </a:defRPr>
+    </a:lvl3pPr>
+    <a:lvl4pPr marL="1371600" algn="l" defTabSz="914400" rtl="0" eaLnBrk="1" latinLnBrk="0" hangingPunct="1">
+      <a:defRPr sz="1200" kern="1200">
+        <a:solidFill>
+          <a:schemeClr val="tx1"/>
+        </a:solidFill>
+        <a:latin typeface="+mn-lt"/>
+        <a:ea typeface="+mn-ea"/>
+        <a:cs typeface="+mn-cs"/>
+      </a:defRPr>
+    </a:lvl4pPr>
+    <a:lvl5pPr marL="1828800" algn="l" defTabSz="914400" rtl="0" eaLnBrk="1" latinLnBrk="0" hangingPunct="1">
+      <a:defRPr sz="1200" kern="1200">
+        <a:solidFill>
+          <a:schemeClr val="tx1"/>
+        </a:solidFill>
+        <a:latin typeface="+mn-lt"/>
+        <a:ea typeface="+mn-ea"/>
+        <a:cs typeface="+mn-cs"/>
+      </a:defRPr>
+    </a:lvl5pPr>
+    <a:lvl6pPr marL="2286000" algn="l" defTabSz="914400" rtl="0" eaLnBrk="1" latinLnBrk="0" hangingPunct="1">
+      <a:defRPr sz="1200" kern="1200">
+        <a:solidFill>
+          <a:schemeClr val="tx1"/>
+        </a:solidFill>
+        <a:latin typeface="+mn-lt"/>
+        <a:ea typeface="+mn-ea"/>
+        <a:cs typeface="+mn-cs"/>
+      </a:defRPr>
+    </a:lvl6pPr>
+    <a:lvl7pPr marL="2743200" algn="l" defTabSz="914400" rtl="0" eaLnBrk="1" latinLnBrk="0" hangingPunct="1">
+      <a:defRPr sz="1200" kern="1200">
+        <a:solidFill>
+          <a:schemeClr val="tx1"/>
+        </a:solidFill>
+        <a:latin typeface="+mn-lt"/>
+        <a:ea typeface="+mn-ea"/>
+        <a:cs typeface="+mn-cs"/>
+      </a:defRPr>
+    </a:lvl7pPr>
+    <a:lvl8pPr marL="3200400" algn="l" defTabSz="914400" rtl="0" eaLnBrk="1" latinLnBrk="0" hangingPunct="1">
+      <a:defRPr sz="1200" kern="1200">
+        <a:solidFill>
+          <a:schemeClr val="tx1"/>
+        </a:solidFill>
+        <a:latin typeface="+mn-lt"/>
+        <a:ea typeface="+mn-ea"/>
+        <a:cs typeface="+mn-cs"/>
+      </a:defRPr>
+    </a:lvl8pPr>
+    <a:lvl9pPr marL="3657600" algn="l" defTabSz="914400" rtl="0" eaLnBrk="1" latinLnBrk="0" hangingPunct="1">
+      <a:defRPr sz="1200" kern="1200">
+        <a:solidFill>
+          <a:schemeClr val="tx1"/>
+        </a:solidFill>
+        <a:latin typeface="+mn-lt"/>
+        <a:ea typeface="+mn-ea"/>
+        <a:cs typeface="+mn-cs"/>
+      </a:defRPr>
+    </a:lvl9pPr>
+  </p:notesStyle>
+</p:notesMaster>
 </file>
 
 <file path=ppt/slideLayouts/slideLayout1.xml><?xml version="1.0" encoding="utf-8"?>
@@ -254,7 +613,7 @@
           <a:p>
             <a:fld id="{B1A3ACBC-60E0-4973-9C3D-EC7362A3F38E}" type="datetimeFigureOut">
               <a:rPr lang="en-US" smtClean="0"/>
-              <a:t>5/25/2025</a:t>
+              <a:t>1/15/2026</a:t>
             </a:fld>
             <a:endParaRPr lang="en-US"/>
           </a:p>
@@ -452,7 +811,7 @@
           <a:p>
             <a:fld id="{B1A3ACBC-60E0-4973-9C3D-EC7362A3F38E}" type="datetimeFigureOut">
               <a:rPr lang="en-US" smtClean="0"/>
-              <a:t>5/25/2025</a:t>
+              <a:t>1/15/2026</a:t>
             </a:fld>
             <a:endParaRPr lang="en-US"/>
           </a:p>
@@ -660,7 +1019,7 @@
           <a:p>
             <a:fld id="{B1A3ACBC-60E0-4973-9C3D-EC7362A3F38E}" type="datetimeFigureOut">
               <a:rPr lang="en-US" smtClean="0"/>
-              <a:t>5/25/2025</a:t>
+              <a:t>1/15/2026</a:t>
             </a:fld>
             <a:endParaRPr lang="en-US"/>
           </a:p>
@@ -858,7 +1217,7 @@
           <a:p>
             <a:fld id="{B1A3ACBC-60E0-4973-9C3D-EC7362A3F38E}" type="datetimeFigureOut">
               <a:rPr lang="en-US" smtClean="0"/>
-              <a:t>5/25/2025</a:t>
+              <a:t>1/15/2026</a:t>
             </a:fld>
             <a:endParaRPr lang="en-US"/>
           </a:p>
@@ -1133,7 +1492,7 @@
           <a:p>
             <a:fld id="{B1A3ACBC-60E0-4973-9C3D-EC7362A3F38E}" type="datetimeFigureOut">
               <a:rPr lang="en-US" smtClean="0"/>
-              <a:t>5/25/2025</a:t>
+              <a:t>1/15/2026</a:t>
             </a:fld>
             <a:endParaRPr lang="en-US"/>
           </a:p>
@@ -1398,7 +1757,7 @@
           <a:p>
             <a:fld id="{B1A3ACBC-60E0-4973-9C3D-EC7362A3F38E}" type="datetimeFigureOut">
               <a:rPr lang="en-US" smtClean="0"/>
-              <a:t>5/25/2025</a:t>
+              <a:t>1/15/2026</a:t>
             </a:fld>
             <a:endParaRPr lang="en-US"/>
           </a:p>
@@ -1810,7 +2169,7 @@
           <a:p>
             <a:fld id="{B1A3ACBC-60E0-4973-9C3D-EC7362A3F38E}" type="datetimeFigureOut">
               <a:rPr lang="en-US" smtClean="0"/>
-              <a:t>5/25/2025</a:t>
+              <a:t>1/15/2026</a:t>
             </a:fld>
             <a:endParaRPr lang="en-US"/>
           </a:p>
@@ -1951,7 +2310,7 @@
           <a:p>
             <a:fld id="{B1A3ACBC-60E0-4973-9C3D-EC7362A3F38E}" type="datetimeFigureOut">
               <a:rPr lang="en-US" smtClean="0"/>
-              <a:t>5/25/2025</a:t>
+              <a:t>1/15/2026</a:t>
             </a:fld>
             <a:endParaRPr lang="en-US"/>
           </a:p>
@@ -2064,7 +2423,7 @@
           <a:p>
             <a:fld id="{B1A3ACBC-60E0-4973-9C3D-EC7362A3F38E}" type="datetimeFigureOut">
               <a:rPr lang="en-US" smtClean="0"/>
-              <a:t>5/25/2025</a:t>
+              <a:t>1/15/2026</a:t>
             </a:fld>
             <a:endParaRPr lang="en-US"/>
           </a:p>
@@ -2375,7 +2734,7 @@
           <a:p>
             <a:fld id="{B1A3ACBC-60E0-4973-9C3D-EC7362A3F38E}" type="datetimeFigureOut">
               <a:rPr lang="en-US" smtClean="0"/>
-              <a:t>5/25/2025</a:t>
+              <a:t>1/15/2026</a:t>
             </a:fld>
             <a:endParaRPr lang="en-US"/>
           </a:p>
@@ -2663,7 +3022,7 @@
           <a:p>
             <a:fld id="{B1A3ACBC-60E0-4973-9C3D-EC7362A3F38E}" type="datetimeFigureOut">
               <a:rPr lang="en-US" smtClean="0"/>
-              <a:t>5/25/2025</a:t>
+              <a:t>1/15/2026</a:t>
             </a:fld>
             <a:endParaRPr lang="en-US"/>
           </a:p>
@@ -2904,7 +3263,7 @@
           <a:p>
             <a:fld id="{B1A3ACBC-60E0-4973-9C3D-EC7362A3F38E}" type="datetimeFigureOut">
               <a:rPr lang="en-US" smtClean="0"/>
-              <a:t>5/25/2025</a:t>
+              <a:t>1/15/2026</a:t>
             </a:fld>
             <a:endParaRPr lang="en-US"/>
           </a:p>
@@ -5121,6 +5480,2205 @@
     <p:extLst>
       <p:ext uri="{BB962C8B-B14F-4D97-AF65-F5344CB8AC3E}">
         <p14:creationId xmlns:p14="http://schemas.microsoft.com/office/powerpoint/2010/main" val="1117526335"/>
+      </p:ext>
+    </p:extLst>
+  </p:cSld>
+  <p:clrMapOvr>
+    <a:masterClrMapping/>
+  </p:clrMapOvr>
+</p:sld>
+</file>
+
+<file path=ppt/slides/slide2.xml><?xml version="1.0" encoding="utf-8"?>
+<p:sld xmlns:a="http://schemas.openxmlformats.org/drawingml/2006/main" xmlns:r="http://schemas.openxmlformats.org/officeDocument/2006/relationships" xmlns:p="http://schemas.openxmlformats.org/presentationml/2006/main">
+  <p:cSld>
+    <p:spTree>
+      <p:nvGrpSpPr>
+        <p:cNvPr id="1" name=""/>
+        <p:cNvGrpSpPr/>
+        <p:nvPr/>
+      </p:nvGrpSpPr>
+      <p:grpSpPr>
+        <a:xfrm>
+          <a:off x="0" y="0"/>
+          <a:ext cx="0" cy="0"/>
+          <a:chOff x="0" y="0"/>
+          <a:chExt cx="0" cy="0"/>
+        </a:xfrm>
+      </p:grpSpPr>
+      <p:pic>
+        <p:nvPicPr>
+          <p:cNvPr id="4" name="Picture 3">
+            <a:extLst>
+              <a:ext uri="{FF2B5EF4-FFF2-40B4-BE49-F238E27FC236}">
+                <a16:creationId xmlns:a16="http://schemas.microsoft.com/office/drawing/2014/main" id="{CEC8AB8E-4C4F-181A-7574-4944EDA52B2C}"/>
+              </a:ext>
+            </a:extLst>
+          </p:cNvPr>
+          <p:cNvPicPr>
+            <a:picLocks noChangeAspect="1"/>
+          </p:cNvPicPr>
+          <p:nvPr/>
+        </p:nvPicPr>
+        <p:blipFill>
+          <a:blip r:embed="rId2">
+            <a:extLst>
+              <a:ext uri="{28A0092B-C50C-407E-A947-70E740481C1C}">
+                <a14:useLocalDpi xmlns:a14="http://schemas.microsoft.com/office/drawing/2010/main" val="0"/>
+              </a:ext>
+            </a:extLst>
+          </a:blip>
+          <a:srcRect l="-1053" t="15789" r="1053" b="22982"/>
+          <a:stretch>
+            <a:fillRect/>
+          </a:stretch>
+        </p:blipFill>
+        <p:spPr>
+          <a:xfrm>
+            <a:off x="1630917" y="512424"/>
+            <a:ext cx="6268621" cy="5117542"/>
+          </a:xfrm>
+          <a:prstGeom prst="rect">
+            <a:avLst/>
+          </a:prstGeom>
+        </p:spPr>
+      </p:pic>
+      <p:pic>
+        <p:nvPicPr>
+          <p:cNvPr id="5" name="Picture 4">
+            <a:extLst>
+              <a:ext uri="{FF2B5EF4-FFF2-40B4-BE49-F238E27FC236}">
+                <a16:creationId xmlns:a16="http://schemas.microsoft.com/office/drawing/2014/main" id="{73F02192-F44A-C39B-2E5B-DF28637879B3}"/>
+              </a:ext>
+            </a:extLst>
+          </p:cNvPr>
+          <p:cNvPicPr>
+            <a:picLocks noChangeAspect="1"/>
+          </p:cNvPicPr>
+          <p:nvPr/>
+        </p:nvPicPr>
+        <p:blipFill>
+          <a:blip r:embed="rId3"/>
+          <a:stretch>
+            <a:fillRect/>
+          </a:stretch>
+        </p:blipFill>
+        <p:spPr>
+          <a:xfrm>
+            <a:off x="5814801" y="512424"/>
+            <a:ext cx="2084737" cy="2839432"/>
+          </a:xfrm>
+          <a:prstGeom prst="rect">
+            <a:avLst/>
+          </a:prstGeom>
+        </p:spPr>
+      </p:pic>
+      <p:pic>
+        <p:nvPicPr>
+          <p:cNvPr id="6" name="Picture 5">
+            <a:extLst>
+              <a:ext uri="{FF2B5EF4-FFF2-40B4-BE49-F238E27FC236}">
+                <a16:creationId xmlns:a16="http://schemas.microsoft.com/office/drawing/2014/main" id="{A13BED09-960B-314F-A48E-5307447D4D7F}"/>
+              </a:ext>
+            </a:extLst>
+          </p:cNvPr>
+          <p:cNvPicPr>
+            <a:picLocks noChangeAspect="1"/>
+          </p:cNvPicPr>
+          <p:nvPr/>
+        </p:nvPicPr>
+        <p:blipFill>
+          <a:blip r:embed="rId4"/>
+          <a:stretch>
+            <a:fillRect/>
+          </a:stretch>
+        </p:blipFill>
+        <p:spPr>
+          <a:xfrm>
+            <a:off x="1692082" y="512424"/>
+            <a:ext cx="4122719" cy="2839432"/>
+          </a:xfrm>
+          <a:prstGeom prst="rect">
+            <a:avLst/>
+          </a:prstGeom>
+        </p:spPr>
+      </p:pic>
+      <p:pic>
+        <p:nvPicPr>
+          <p:cNvPr id="7" name="Graphic 6" descr="Badge 1 with solid fill">
+            <a:extLst>
+              <a:ext uri="{FF2B5EF4-FFF2-40B4-BE49-F238E27FC236}">
+                <a16:creationId xmlns:a16="http://schemas.microsoft.com/office/drawing/2014/main" id="{B675104D-2F44-44D2-F5DE-6FF39DF34ABD}"/>
+              </a:ext>
+            </a:extLst>
+          </p:cNvPr>
+          <p:cNvPicPr>
+            <a:picLocks noChangeAspect="1"/>
+          </p:cNvPicPr>
+          <p:nvPr/>
+        </p:nvPicPr>
+        <p:blipFill>
+          <a:blip r:embed="rId5">
+            <a:extLst>
+              <a:ext uri="{96DAC541-7B7A-43D3-8B79-37D633B846F1}">
+                <asvg:svgBlip xmlns:asvg="http://schemas.microsoft.com/office/drawing/2016/SVG/main" r:embed="rId6"/>
+              </a:ext>
+            </a:extLst>
+          </a:blip>
+          <a:stretch>
+            <a:fillRect/>
+          </a:stretch>
+        </p:blipFill>
+        <p:spPr>
+          <a:xfrm>
+            <a:off x="3456432" y="1822056"/>
+            <a:ext cx="408432" cy="408432"/>
+          </a:xfrm>
+          <a:prstGeom prst="rect">
+            <a:avLst/>
+          </a:prstGeom>
+        </p:spPr>
+      </p:pic>
+      <p:pic>
+        <p:nvPicPr>
+          <p:cNvPr id="8" name="Graphic 7" descr="Badge 4 with solid fill">
+            <a:extLst>
+              <a:ext uri="{FF2B5EF4-FFF2-40B4-BE49-F238E27FC236}">
+                <a16:creationId xmlns:a16="http://schemas.microsoft.com/office/drawing/2014/main" id="{69CAAAC9-4018-2079-A6A8-26C9F5F8B5EF}"/>
+              </a:ext>
+            </a:extLst>
+          </p:cNvPr>
+          <p:cNvPicPr>
+            <a:picLocks noChangeAspect="1"/>
+          </p:cNvPicPr>
+          <p:nvPr/>
+        </p:nvPicPr>
+        <p:blipFill>
+          <a:blip r:embed="rId7">
+            <a:extLst>
+              <a:ext uri="{96DAC541-7B7A-43D3-8B79-37D633B846F1}">
+                <asvg:svgBlip xmlns:asvg="http://schemas.microsoft.com/office/drawing/2016/SVG/main" r:embed="rId8"/>
+              </a:ext>
+            </a:extLst>
+          </a:blip>
+          <a:stretch>
+            <a:fillRect/>
+          </a:stretch>
+        </p:blipFill>
+        <p:spPr>
+          <a:xfrm>
+            <a:off x="6553200" y="2595707"/>
+            <a:ext cx="475488" cy="475488"/>
+          </a:xfrm>
+          <a:prstGeom prst="rect">
+            <a:avLst/>
+          </a:prstGeom>
+        </p:spPr>
+      </p:pic>
+      <p:pic>
+        <p:nvPicPr>
+          <p:cNvPr id="9" name="Graphic 8" descr="Badge 3 with solid fill">
+            <a:extLst>
+              <a:ext uri="{FF2B5EF4-FFF2-40B4-BE49-F238E27FC236}">
+                <a16:creationId xmlns:a16="http://schemas.microsoft.com/office/drawing/2014/main" id="{77A0AABD-21A4-E95A-09DE-FEB5B6D4EBE2}"/>
+              </a:ext>
+            </a:extLst>
+          </p:cNvPr>
+          <p:cNvPicPr>
+            <a:picLocks noChangeAspect="1"/>
+          </p:cNvPicPr>
+          <p:nvPr/>
+        </p:nvPicPr>
+        <p:blipFill>
+          <a:blip r:embed="rId9">
+            <a:extLst>
+              <a:ext uri="{96DAC541-7B7A-43D3-8B79-37D633B846F1}">
+                <asvg:svgBlip xmlns:asvg="http://schemas.microsoft.com/office/drawing/2016/SVG/main" r:embed="rId10"/>
+              </a:ext>
+            </a:extLst>
+          </a:blip>
+          <a:stretch>
+            <a:fillRect/>
+          </a:stretch>
+        </p:blipFill>
+        <p:spPr>
+          <a:xfrm>
+            <a:off x="5484000" y="4383024"/>
+            <a:ext cx="488328" cy="488328"/>
+          </a:xfrm>
+          <a:prstGeom prst="rect">
+            <a:avLst/>
+          </a:prstGeom>
+        </p:spPr>
+      </p:pic>
+      <p:pic>
+        <p:nvPicPr>
+          <p:cNvPr id="10" name="Graphic 9" descr="Badge with solid fill">
+            <a:extLst>
+              <a:ext uri="{FF2B5EF4-FFF2-40B4-BE49-F238E27FC236}">
+                <a16:creationId xmlns:a16="http://schemas.microsoft.com/office/drawing/2014/main" id="{A173740A-F530-1AF9-A220-B3D5FE902418}"/>
+              </a:ext>
+            </a:extLst>
+          </p:cNvPr>
+          <p:cNvPicPr>
+            <a:picLocks noChangeAspect="1"/>
+          </p:cNvPicPr>
+          <p:nvPr/>
+        </p:nvPicPr>
+        <p:blipFill>
+          <a:blip r:embed="rId11">
+            <a:extLst>
+              <a:ext uri="{96DAC541-7B7A-43D3-8B79-37D633B846F1}">
+                <asvg:svgBlip xmlns:asvg="http://schemas.microsoft.com/office/drawing/2016/SVG/main" r:embed="rId12"/>
+              </a:ext>
+            </a:extLst>
+          </a:blip>
+          <a:stretch>
+            <a:fillRect/>
+          </a:stretch>
+        </p:blipFill>
+        <p:spPr>
+          <a:xfrm>
+            <a:off x="4715904" y="1085088"/>
+            <a:ext cx="485928" cy="485928"/>
+          </a:xfrm>
+          <a:prstGeom prst="rect">
+            <a:avLst/>
+          </a:prstGeom>
+        </p:spPr>
+      </p:pic>
+    </p:spTree>
+    <p:extLst>
+      <p:ext uri="{BB962C8B-B14F-4D97-AF65-F5344CB8AC3E}">
+        <p14:creationId xmlns:p14="http://schemas.microsoft.com/office/powerpoint/2010/main" val="636145382"/>
+      </p:ext>
+    </p:extLst>
+  </p:cSld>
+  <p:clrMapOvr>
+    <a:masterClrMapping/>
+  </p:clrMapOvr>
+</p:sld>
+</file>
+
+<file path=ppt/slides/slide3.xml><?xml version="1.0" encoding="utf-8"?>
+<p:sld xmlns:a="http://schemas.openxmlformats.org/drawingml/2006/main" xmlns:r="http://schemas.openxmlformats.org/officeDocument/2006/relationships" xmlns:p="http://schemas.openxmlformats.org/presentationml/2006/main">
+  <p:cSld>
+    <p:spTree>
+      <p:nvGrpSpPr>
+        <p:cNvPr id="1" name=""/>
+        <p:cNvGrpSpPr/>
+        <p:nvPr/>
+      </p:nvGrpSpPr>
+      <p:grpSpPr>
+        <a:xfrm>
+          <a:off x="0" y="0"/>
+          <a:ext cx="0" cy="0"/>
+          <a:chOff x="0" y="0"/>
+          <a:chExt cx="0" cy="0"/>
+        </a:xfrm>
+      </p:grpSpPr>
+      <p:sp>
+        <p:nvSpPr>
+          <p:cNvPr id="7" name="Rectangle: Rounded Corners 6">
+            <a:extLst>
+              <a:ext uri="{FF2B5EF4-FFF2-40B4-BE49-F238E27FC236}">
+                <a16:creationId xmlns:a16="http://schemas.microsoft.com/office/drawing/2014/main" id="{35DD5CFD-30ED-EABF-0619-BBFA33E5E02A}"/>
+              </a:ext>
+            </a:extLst>
+          </p:cNvPr>
+          <p:cNvSpPr>
+            <a:spLocks/>
+          </p:cNvSpPr>
+          <p:nvPr/>
+        </p:nvSpPr>
+        <p:spPr>
+          <a:xfrm>
+            <a:off x="807930" y="2367524"/>
+            <a:ext cx="9876696" cy="3754676"/>
+          </a:xfrm>
+          <a:prstGeom prst="roundRect">
+            <a:avLst>
+              <a:gd name="adj" fmla="val 2632"/>
+            </a:avLst>
+          </a:prstGeom>
+          <a:solidFill>
+            <a:schemeClr val="accent6">
+              <a:lumMod val="40000"/>
+              <a:lumOff val="60000"/>
+              <a:alpha val="35000"/>
+            </a:schemeClr>
+          </a:solidFill>
+          <a:ln>
+            <a:noFill/>
+          </a:ln>
+        </p:spPr>
+        <p:style>
+          <a:lnRef idx="2">
+            <a:schemeClr val="accent1">
+              <a:shade val="15000"/>
+            </a:schemeClr>
+          </a:lnRef>
+          <a:fillRef idx="1">
+            <a:schemeClr val="accent1"/>
+          </a:fillRef>
+          <a:effectRef idx="0">
+            <a:schemeClr val="accent1"/>
+          </a:effectRef>
+          <a:fontRef idx="minor">
+            <a:schemeClr val="lt1"/>
+          </a:fontRef>
+        </p:style>
+        <p:txBody>
+          <a:bodyPr rtlCol="0" anchor="ctr"/>
+          <a:lstStyle/>
+          <a:p>
+            <a:pPr algn="ctr"/>
+            <a:endParaRPr lang="en-US" dirty="0"/>
+          </a:p>
+        </p:txBody>
+      </p:sp>
+      <p:sp>
+        <p:nvSpPr>
+          <p:cNvPr id="8" name="Rectangle: Rounded Corners 7">
+            <a:extLst>
+              <a:ext uri="{FF2B5EF4-FFF2-40B4-BE49-F238E27FC236}">
+                <a16:creationId xmlns:a16="http://schemas.microsoft.com/office/drawing/2014/main" id="{F87FBB6F-200A-FF35-D794-CBEAB90998C5}"/>
+              </a:ext>
+            </a:extLst>
+          </p:cNvPr>
+          <p:cNvSpPr/>
+          <p:nvPr/>
+        </p:nvSpPr>
+        <p:spPr>
+          <a:xfrm>
+            <a:off x="807929" y="407096"/>
+            <a:ext cx="7421671" cy="1678488"/>
+          </a:xfrm>
+          <a:prstGeom prst="roundRect">
+            <a:avLst>
+              <a:gd name="adj" fmla="val 5473"/>
+            </a:avLst>
+          </a:prstGeom>
+          <a:solidFill>
+            <a:schemeClr val="accent2">
+              <a:lumMod val="40000"/>
+              <a:lumOff val="60000"/>
+              <a:alpha val="35000"/>
+            </a:schemeClr>
+          </a:solidFill>
+          <a:ln>
+            <a:noFill/>
+          </a:ln>
+        </p:spPr>
+        <p:style>
+          <a:lnRef idx="2">
+            <a:schemeClr val="accent1">
+              <a:shade val="15000"/>
+            </a:schemeClr>
+          </a:lnRef>
+          <a:fillRef idx="1">
+            <a:schemeClr val="accent1"/>
+          </a:fillRef>
+          <a:effectRef idx="0">
+            <a:schemeClr val="accent1"/>
+          </a:effectRef>
+          <a:fontRef idx="minor">
+            <a:schemeClr val="lt1"/>
+          </a:fontRef>
+        </p:style>
+        <p:txBody>
+          <a:bodyPr rtlCol="0" anchor="ctr"/>
+          <a:lstStyle/>
+          <a:p>
+            <a:pPr algn="ctr"/>
+            <a:endParaRPr lang="en-US"/>
+          </a:p>
+        </p:txBody>
+      </p:sp>
+      <p:pic>
+        <p:nvPicPr>
+          <p:cNvPr id="9" name="Graphic 8" descr="Cloud outline">
+            <a:extLst>
+              <a:ext uri="{FF2B5EF4-FFF2-40B4-BE49-F238E27FC236}">
+                <a16:creationId xmlns:a16="http://schemas.microsoft.com/office/drawing/2014/main" id="{0BAEEF6A-95F7-929E-9BA9-52314FFD6A1E}"/>
+              </a:ext>
+            </a:extLst>
+          </p:cNvPr>
+          <p:cNvPicPr>
+            <a:picLocks noChangeAspect="1"/>
+          </p:cNvPicPr>
+          <p:nvPr/>
+        </p:nvPicPr>
+        <p:blipFill>
+          <a:blip r:embed="rId2">
+            <a:extLst>
+              <a:ext uri="{96DAC541-7B7A-43D3-8B79-37D633B846F1}">
+                <asvg:svgBlip xmlns:asvg="http://schemas.microsoft.com/office/drawing/2016/SVG/main" r:embed="rId3"/>
+              </a:ext>
+            </a:extLst>
+          </a:blip>
+          <a:stretch>
+            <a:fillRect/>
+          </a:stretch>
+        </p:blipFill>
+        <p:spPr>
+          <a:xfrm>
+            <a:off x="1083367" y="758910"/>
+            <a:ext cx="669945" cy="669945"/>
+          </a:xfrm>
+          <a:prstGeom prst="rect">
+            <a:avLst/>
+          </a:prstGeom>
+        </p:spPr>
+      </p:pic>
+      <p:sp>
+        <p:nvSpPr>
+          <p:cNvPr id="10" name="TextBox 9">
+            <a:extLst>
+              <a:ext uri="{FF2B5EF4-FFF2-40B4-BE49-F238E27FC236}">
+                <a16:creationId xmlns:a16="http://schemas.microsoft.com/office/drawing/2014/main" id="{62FDD647-3C9A-4197-C57A-076B961C0230}"/>
+              </a:ext>
+            </a:extLst>
+          </p:cNvPr>
+          <p:cNvSpPr txBox="1"/>
+          <p:nvPr/>
+        </p:nvSpPr>
+        <p:spPr>
+          <a:xfrm>
+            <a:off x="966997" y="1294292"/>
+            <a:ext cx="902683" cy="276999"/>
+          </a:xfrm>
+          <a:prstGeom prst="rect">
+            <a:avLst/>
+          </a:prstGeom>
+          <a:noFill/>
+        </p:spPr>
+        <p:txBody>
+          <a:bodyPr wrap="none" rtlCol="0">
+            <a:spAutoFit/>
+          </a:bodyPr>
+          <a:lstStyle/>
+          <a:p>
+            <a:r>
+              <a:rPr lang="en-US" sz="1200" b="1" dirty="0">
+                <a:solidFill>
+                  <a:schemeClr val="accent2">
+                    <a:lumMod val="75000"/>
+                  </a:schemeClr>
+                </a:solidFill>
+              </a:rPr>
+              <a:t>cloudflare</a:t>
+            </a:r>
+          </a:p>
+        </p:txBody>
+      </p:sp>
+      <p:pic>
+        <p:nvPicPr>
+          <p:cNvPr id="11" name="Graphic 10" descr="Users with solid fill">
+            <a:extLst>
+              <a:ext uri="{FF2B5EF4-FFF2-40B4-BE49-F238E27FC236}">
+                <a16:creationId xmlns:a16="http://schemas.microsoft.com/office/drawing/2014/main" id="{9B260F5E-0B03-52B9-5ED3-237D42CC85C2}"/>
+              </a:ext>
+            </a:extLst>
+          </p:cNvPr>
+          <p:cNvPicPr>
+            <a:picLocks noChangeAspect="1"/>
+          </p:cNvPicPr>
+          <p:nvPr/>
+        </p:nvPicPr>
+        <p:blipFill>
+          <a:blip r:embed="rId4">
+            <a:extLst>
+              <a:ext uri="{96DAC541-7B7A-43D3-8B79-37D633B846F1}">
+                <asvg:svgBlip xmlns:asvg="http://schemas.microsoft.com/office/drawing/2016/SVG/main" r:embed="rId5"/>
+              </a:ext>
+            </a:extLst>
+          </a:blip>
+          <a:stretch>
+            <a:fillRect/>
+          </a:stretch>
+        </p:blipFill>
+        <p:spPr>
+          <a:xfrm>
+            <a:off x="10172814" y="516606"/>
+            <a:ext cx="914400" cy="914400"/>
+          </a:xfrm>
+          <a:prstGeom prst="rect">
+            <a:avLst/>
+          </a:prstGeom>
+        </p:spPr>
+      </p:pic>
+      <p:sp>
+        <p:nvSpPr>
+          <p:cNvPr id="12" name="TextBox 11">
+            <a:extLst>
+              <a:ext uri="{FF2B5EF4-FFF2-40B4-BE49-F238E27FC236}">
+                <a16:creationId xmlns:a16="http://schemas.microsoft.com/office/drawing/2014/main" id="{2419C393-B140-5E57-5466-A22847E98EF4}"/>
+              </a:ext>
+            </a:extLst>
+          </p:cNvPr>
+          <p:cNvSpPr txBox="1"/>
+          <p:nvPr/>
+        </p:nvSpPr>
+        <p:spPr>
+          <a:xfrm>
+            <a:off x="10302465" y="1248126"/>
+            <a:ext cx="708079" cy="461665"/>
+          </a:xfrm>
+          <a:prstGeom prst="rect">
+            <a:avLst/>
+          </a:prstGeom>
+          <a:noFill/>
+        </p:spPr>
+        <p:txBody>
+          <a:bodyPr wrap="none" rtlCol="0">
+            <a:spAutoFit/>
+          </a:bodyPr>
+          <a:lstStyle/>
+          <a:p>
+            <a:pPr algn="ctr"/>
+            <a:r>
+              <a:rPr lang="en-US" sz="1200" dirty="0"/>
+              <a:t>Internet</a:t>
+            </a:r>
+          </a:p>
+          <a:p>
+            <a:pPr algn="ctr"/>
+            <a:r>
+              <a:rPr lang="en-US" sz="1200" dirty="0"/>
+              <a:t>Users</a:t>
+            </a:r>
+          </a:p>
+        </p:txBody>
+      </p:sp>
+      <p:cxnSp>
+        <p:nvCxnSpPr>
+          <p:cNvPr id="13" name="Straight Arrow Connector 12">
+            <a:extLst>
+              <a:ext uri="{FF2B5EF4-FFF2-40B4-BE49-F238E27FC236}">
+                <a16:creationId xmlns:a16="http://schemas.microsoft.com/office/drawing/2014/main" id="{7FEE7CD5-EC51-582C-0F7D-5DCDA14D511B}"/>
+              </a:ext>
+            </a:extLst>
+          </p:cNvPr>
+          <p:cNvCxnSpPr>
+            <a:cxnSpLocks/>
+          </p:cNvCxnSpPr>
+          <p:nvPr/>
+        </p:nvCxnSpPr>
+        <p:spPr>
+          <a:xfrm flipH="1">
+            <a:off x="8374380" y="1246340"/>
+            <a:ext cx="1743961" cy="0"/>
+          </a:xfrm>
+          <a:prstGeom prst="straightConnector1">
+            <a:avLst/>
+          </a:prstGeom>
+          <a:ln>
+            <a:tailEnd type="triangle"/>
+          </a:ln>
+        </p:spPr>
+        <p:style>
+          <a:lnRef idx="2">
+            <a:schemeClr val="accent1"/>
+          </a:lnRef>
+          <a:fillRef idx="0">
+            <a:schemeClr val="accent1"/>
+          </a:fillRef>
+          <a:effectRef idx="1">
+            <a:schemeClr val="accent1"/>
+          </a:effectRef>
+          <a:fontRef idx="minor">
+            <a:schemeClr val="tx1"/>
+          </a:fontRef>
+        </p:style>
+      </p:cxnSp>
+      <p:sp>
+        <p:nvSpPr>
+          <p:cNvPr id="14" name="TextBox 13">
+            <a:extLst>
+              <a:ext uri="{FF2B5EF4-FFF2-40B4-BE49-F238E27FC236}">
+                <a16:creationId xmlns:a16="http://schemas.microsoft.com/office/drawing/2014/main" id="{D7ED8A68-BBA4-A35D-42EC-36183216C84C}"/>
+              </a:ext>
+            </a:extLst>
+          </p:cNvPr>
+          <p:cNvSpPr txBox="1"/>
+          <p:nvPr/>
+        </p:nvSpPr>
+        <p:spPr>
+          <a:xfrm>
+            <a:off x="8328725" y="1290275"/>
+            <a:ext cx="1789616" cy="246221"/>
+          </a:xfrm>
+          <a:prstGeom prst="rect">
+            <a:avLst/>
+          </a:prstGeom>
+          <a:noFill/>
+        </p:spPr>
+        <p:txBody>
+          <a:bodyPr wrap="square" rtlCol="0">
+            <a:spAutoFit/>
+          </a:bodyPr>
+          <a:lstStyle/>
+          <a:p>
+            <a:pPr algn="ctr"/>
+            <a:r>
+              <a:rPr lang="en-US" sz="1000" dirty="0"/>
+              <a:t>&lt;subdomain&gt;.example.com</a:t>
+            </a:r>
+          </a:p>
+        </p:txBody>
+      </p:sp>
+      <p:sp>
+        <p:nvSpPr>
+          <p:cNvPr id="15" name="Rectangle 14">
+            <a:extLst>
+              <a:ext uri="{FF2B5EF4-FFF2-40B4-BE49-F238E27FC236}">
+                <a16:creationId xmlns:a16="http://schemas.microsoft.com/office/drawing/2014/main" id="{E5363AE3-A8BE-B69C-44D9-EDEA69ADFC92}"/>
+              </a:ext>
+            </a:extLst>
+          </p:cNvPr>
+          <p:cNvSpPr/>
+          <p:nvPr/>
+        </p:nvSpPr>
+        <p:spPr>
+          <a:xfrm>
+            <a:off x="6313170" y="1017740"/>
+            <a:ext cx="1805940" cy="457200"/>
+          </a:xfrm>
+          <a:prstGeom prst="rect">
+            <a:avLst/>
+          </a:prstGeom>
+          <a:solidFill>
+            <a:schemeClr val="accent2">
+              <a:lumMod val="60000"/>
+              <a:lumOff val="40000"/>
+            </a:schemeClr>
+          </a:solidFill>
+          <a:ln>
+            <a:noFill/>
+          </a:ln>
+        </p:spPr>
+        <p:style>
+          <a:lnRef idx="2">
+            <a:schemeClr val="accent1">
+              <a:shade val="15000"/>
+            </a:schemeClr>
+          </a:lnRef>
+          <a:fillRef idx="1">
+            <a:schemeClr val="accent1"/>
+          </a:fillRef>
+          <a:effectRef idx="0">
+            <a:schemeClr val="accent1"/>
+          </a:effectRef>
+          <a:fontRef idx="minor">
+            <a:schemeClr val="lt1"/>
+          </a:fontRef>
+        </p:style>
+        <p:txBody>
+          <a:bodyPr rtlCol="0" anchor="ctr"/>
+          <a:lstStyle/>
+          <a:p>
+            <a:pPr algn="ctr"/>
+            <a:r>
+              <a:rPr lang="en-US" sz="1400" dirty="0">
+                <a:solidFill>
+                  <a:schemeClr val="tx1">
+                    <a:lumMod val="85000"/>
+                    <a:lumOff val="15000"/>
+                  </a:schemeClr>
+                </a:solidFill>
+              </a:rPr>
+              <a:t>Domain Registered &amp; SSL Configured</a:t>
+            </a:r>
+          </a:p>
+        </p:txBody>
+      </p:sp>
+      <p:sp>
+        <p:nvSpPr>
+          <p:cNvPr id="16" name="Rectangle 15">
+            <a:extLst>
+              <a:ext uri="{FF2B5EF4-FFF2-40B4-BE49-F238E27FC236}">
+                <a16:creationId xmlns:a16="http://schemas.microsoft.com/office/drawing/2014/main" id="{59BD05F8-F875-3DEB-58D1-219D0605E18F}"/>
+              </a:ext>
+            </a:extLst>
+          </p:cNvPr>
+          <p:cNvSpPr/>
+          <p:nvPr/>
+        </p:nvSpPr>
+        <p:spPr>
+          <a:xfrm>
+            <a:off x="4179570" y="1017740"/>
+            <a:ext cx="1805940" cy="457200"/>
+          </a:xfrm>
+          <a:prstGeom prst="rect">
+            <a:avLst/>
+          </a:prstGeom>
+          <a:solidFill>
+            <a:schemeClr val="accent2">
+              <a:lumMod val="60000"/>
+              <a:lumOff val="40000"/>
+            </a:schemeClr>
+          </a:solidFill>
+          <a:ln>
+            <a:noFill/>
+          </a:ln>
+        </p:spPr>
+        <p:style>
+          <a:lnRef idx="2">
+            <a:schemeClr val="accent1">
+              <a:shade val="15000"/>
+            </a:schemeClr>
+          </a:lnRef>
+          <a:fillRef idx="1">
+            <a:schemeClr val="accent1"/>
+          </a:fillRef>
+          <a:effectRef idx="0">
+            <a:schemeClr val="accent1"/>
+          </a:effectRef>
+          <a:fontRef idx="minor">
+            <a:schemeClr val="lt1"/>
+          </a:fontRef>
+        </p:style>
+        <p:txBody>
+          <a:bodyPr rtlCol="0" anchor="ctr"/>
+          <a:lstStyle/>
+          <a:p>
+            <a:pPr algn="ctr"/>
+            <a:r>
+              <a:rPr lang="en-US" sz="1400" dirty="0">
+                <a:solidFill>
+                  <a:schemeClr val="tx1">
+                    <a:lumMod val="85000"/>
+                    <a:lumOff val="15000"/>
+                  </a:schemeClr>
+                </a:solidFill>
+              </a:rPr>
+              <a:t>Application &amp; Policies</a:t>
+            </a:r>
+          </a:p>
+        </p:txBody>
+      </p:sp>
+      <p:sp>
+        <p:nvSpPr>
+          <p:cNvPr id="17" name="Rectangle 16">
+            <a:extLst>
+              <a:ext uri="{FF2B5EF4-FFF2-40B4-BE49-F238E27FC236}">
+                <a16:creationId xmlns:a16="http://schemas.microsoft.com/office/drawing/2014/main" id="{D982991E-B4A3-C0FD-72E3-8401C9C4EE44}"/>
+              </a:ext>
+            </a:extLst>
+          </p:cNvPr>
+          <p:cNvSpPr/>
+          <p:nvPr/>
+        </p:nvSpPr>
+        <p:spPr>
+          <a:xfrm>
+            <a:off x="2073660" y="1017740"/>
+            <a:ext cx="1805940" cy="457200"/>
+          </a:xfrm>
+          <a:prstGeom prst="rect">
+            <a:avLst/>
+          </a:prstGeom>
+          <a:solidFill>
+            <a:schemeClr val="accent2">
+              <a:lumMod val="60000"/>
+              <a:lumOff val="40000"/>
+            </a:schemeClr>
+          </a:solidFill>
+          <a:ln>
+            <a:noFill/>
+          </a:ln>
+        </p:spPr>
+        <p:style>
+          <a:lnRef idx="2">
+            <a:schemeClr val="accent1">
+              <a:shade val="15000"/>
+            </a:schemeClr>
+          </a:lnRef>
+          <a:fillRef idx="1">
+            <a:schemeClr val="accent1"/>
+          </a:fillRef>
+          <a:effectRef idx="0">
+            <a:schemeClr val="accent1"/>
+          </a:effectRef>
+          <a:fontRef idx="minor">
+            <a:schemeClr val="lt1"/>
+          </a:fontRef>
+        </p:style>
+        <p:txBody>
+          <a:bodyPr rtlCol="0" anchor="ctr"/>
+          <a:lstStyle/>
+          <a:p>
+            <a:pPr algn="ctr"/>
+            <a:r>
+              <a:rPr lang="en-US" sz="1400" dirty="0">
+                <a:solidFill>
+                  <a:schemeClr val="tx1">
+                    <a:lumMod val="85000"/>
+                    <a:lumOff val="15000"/>
+                  </a:schemeClr>
+                </a:solidFill>
+              </a:rPr>
+              <a:t>Cloudflare Tunnel</a:t>
+            </a:r>
+          </a:p>
+        </p:txBody>
+      </p:sp>
+      <p:cxnSp>
+        <p:nvCxnSpPr>
+          <p:cNvPr id="18" name="Straight Arrow Connector 17">
+            <a:extLst>
+              <a:ext uri="{FF2B5EF4-FFF2-40B4-BE49-F238E27FC236}">
+                <a16:creationId xmlns:a16="http://schemas.microsoft.com/office/drawing/2014/main" id="{44DF8E01-2BBF-D495-B3CE-2F9231E2B198}"/>
+              </a:ext>
+            </a:extLst>
+          </p:cNvPr>
+          <p:cNvCxnSpPr>
+            <a:stCxn id="15" idx="1"/>
+            <a:endCxn id="16" idx="3"/>
+          </p:cNvCxnSpPr>
+          <p:nvPr/>
+        </p:nvCxnSpPr>
+        <p:spPr>
+          <a:xfrm flipH="1">
+            <a:off x="5985510" y="1246340"/>
+            <a:ext cx="327660" cy="0"/>
+          </a:xfrm>
+          <a:prstGeom prst="straightConnector1">
+            <a:avLst/>
+          </a:prstGeom>
+          <a:ln>
+            <a:tailEnd type="triangle"/>
+          </a:ln>
+        </p:spPr>
+        <p:style>
+          <a:lnRef idx="2">
+            <a:schemeClr val="accent1"/>
+          </a:lnRef>
+          <a:fillRef idx="0">
+            <a:schemeClr val="accent1"/>
+          </a:fillRef>
+          <a:effectRef idx="1">
+            <a:schemeClr val="accent1"/>
+          </a:effectRef>
+          <a:fontRef idx="minor">
+            <a:schemeClr val="tx1"/>
+          </a:fontRef>
+        </p:style>
+      </p:cxnSp>
+      <p:cxnSp>
+        <p:nvCxnSpPr>
+          <p:cNvPr id="19" name="Straight Arrow Connector 18">
+            <a:extLst>
+              <a:ext uri="{FF2B5EF4-FFF2-40B4-BE49-F238E27FC236}">
+                <a16:creationId xmlns:a16="http://schemas.microsoft.com/office/drawing/2014/main" id="{32F550CD-0D4B-8071-DCF1-5E730CF17173}"/>
+              </a:ext>
+            </a:extLst>
+          </p:cNvPr>
+          <p:cNvCxnSpPr>
+            <a:stCxn id="16" idx="1"/>
+          </p:cNvCxnSpPr>
+          <p:nvPr/>
+        </p:nvCxnSpPr>
+        <p:spPr>
+          <a:xfrm flipH="1">
+            <a:off x="3879600" y="1246340"/>
+            <a:ext cx="299970" cy="0"/>
+          </a:xfrm>
+          <a:prstGeom prst="straightConnector1">
+            <a:avLst/>
+          </a:prstGeom>
+          <a:ln>
+            <a:tailEnd type="triangle"/>
+          </a:ln>
+        </p:spPr>
+        <p:style>
+          <a:lnRef idx="2">
+            <a:schemeClr val="accent1"/>
+          </a:lnRef>
+          <a:fillRef idx="0">
+            <a:schemeClr val="accent1"/>
+          </a:fillRef>
+          <a:effectRef idx="1">
+            <a:schemeClr val="accent1"/>
+          </a:effectRef>
+          <a:fontRef idx="minor">
+            <a:schemeClr val="tx1"/>
+          </a:fontRef>
+        </p:style>
+      </p:cxnSp>
+      <p:pic>
+        <p:nvPicPr>
+          <p:cNvPr id="20" name="Graphic 19" descr="House outline">
+            <a:extLst>
+              <a:ext uri="{FF2B5EF4-FFF2-40B4-BE49-F238E27FC236}">
+                <a16:creationId xmlns:a16="http://schemas.microsoft.com/office/drawing/2014/main" id="{BD96E778-04FD-5E84-5D6A-5971EAFEA450}"/>
+              </a:ext>
+            </a:extLst>
+          </p:cNvPr>
+          <p:cNvPicPr>
+            <a:picLocks noChangeAspect="1"/>
+          </p:cNvPicPr>
+          <p:nvPr/>
+        </p:nvPicPr>
+        <p:blipFill>
+          <a:blip r:embed="rId6">
+            <a:extLst>
+              <a:ext uri="{96DAC541-7B7A-43D3-8B79-37D633B846F1}">
+                <asvg:svgBlip xmlns:asvg="http://schemas.microsoft.com/office/drawing/2016/SVG/main" r:embed="rId7"/>
+              </a:ext>
+            </a:extLst>
+          </a:blip>
+          <a:stretch>
+            <a:fillRect/>
+          </a:stretch>
+        </p:blipFill>
+        <p:spPr>
+          <a:xfrm>
+            <a:off x="956019" y="2660436"/>
+            <a:ext cx="674370" cy="674370"/>
+          </a:xfrm>
+          <a:prstGeom prst="rect">
+            <a:avLst/>
+          </a:prstGeom>
+        </p:spPr>
+      </p:pic>
+      <p:sp>
+        <p:nvSpPr>
+          <p:cNvPr id="21" name="TextBox 20">
+            <a:extLst>
+              <a:ext uri="{FF2B5EF4-FFF2-40B4-BE49-F238E27FC236}">
+                <a16:creationId xmlns:a16="http://schemas.microsoft.com/office/drawing/2014/main" id="{E7080ECF-856F-F9AF-BBDA-F5F31D372621}"/>
+              </a:ext>
+            </a:extLst>
+          </p:cNvPr>
+          <p:cNvSpPr txBox="1"/>
+          <p:nvPr/>
+        </p:nvSpPr>
+        <p:spPr>
+          <a:xfrm>
+            <a:off x="869642" y="3259128"/>
+            <a:ext cx="802212" cy="461665"/>
+          </a:xfrm>
+          <a:prstGeom prst="rect">
+            <a:avLst/>
+          </a:prstGeom>
+          <a:noFill/>
+        </p:spPr>
+        <p:txBody>
+          <a:bodyPr wrap="square" rtlCol="0">
+            <a:spAutoFit/>
+          </a:bodyPr>
+          <a:lstStyle/>
+          <a:p>
+            <a:pPr algn="ctr"/>
+            <a:r>
+              <a:rPr lang="en-US" sz="1200" b="1" dirty="0">
+                <a:solidFill>
+                  <a:schemeClr val="accent6">
+                    <a:lumMod val="75000"/>
+                  </a:schemeClr>
+                </a:solidFill>
+              </a:rPr>
+              <a:t>Home Network</a:t>
+            </a:r>
+          </a:p>
+        </p:txBody>
+      </p:sp>
+      <p:sp>
+        <p:nvSpPr>
+          <p:cNvPr id="22" name="Rectangle: Rounded Corners 21">
+            <a:extLst>
+              <a:ext uri="{FF2B5EF4-FFF2-40B4-BE49-F238E27FC236}">
+                <a16:creationId xmlns:a16="http://schemas.microsoft.com/office/drawing/2014/main" id="{4F99234F-850F-7609-4C61-56BD2202A6FB}"/>
+              </a:ext>
+            </a:extLst>
+          </p:cNvPr>
+          <p:cNvSpPr>
+            <a:spLocks noGrp="1" noRot="1" noMove="1" noResize="1" noEditPoints="1" noAdjustHandles="1" noChangeArrowheads="1" noChangeShapeType="1"/>
+          </p:cNvSpPr>
+          <p:nvPr/>
+        </p:nvSpPr>
+        <p:spPr>
+          <a:xfrm>
+            <a:off x="1681229" y="2514600"/>
+            <a:ext cx="4631941" cy="1865376"/>
+          </a:xfrm>
+          <a:prstGeom prst="roundRect">
+            <a:avLst>
+              <a:gd name="adj" fmla="val 2632"/>
+            </a:avLst>
+          </a:prstGeom>
+          <a:solidFill>
+            <a:schemeClr val="accent6">
+              <a:lumMod val="60000"/>
+              <a:lumOff val="40000"/>
+              <a:alpha val="35000"/>
+            </a:schemeClr>
+          </a:solidFill>
+          <a:ln>
+            <a:noFill/>
+          </a:ln>
+        </p:spPr>
+        <p:style>
+          <a:lnRef idx="2">
+            <a:schemeClr val="accent1">
+              <a:shade val="15000"/>
+            </a:schemeClr>
+          </a:lnRef>
+          <a:fillRef idx="1">
+            <a:schemeClr val="accent1"/>
+          </a:fillRef>
+          <a:effectRef idx="0">
+            <a:schemeClr val="accent1"/>
+          </a:effectRef>
+          <a:fontRef idx="minor">
+            <a:schemeClr val="lt1"/>
+          </a:fontRef>
+        </p:style>
+        <p:txBody>
+          <a:bodyPr rtlCol="0" anchor="ctr"/>
+          <a:lstStyle/>
+          <a:p>
+            <a:pPr algn="ctr"/>
+            <a:endParaRPr lang="en-US" dirty="0"/>
+          </a:p>
+        </p:txBody>
+      </p:sp>
+      <p:pic>
+        <p:nvPicPr>
+          <p:cNvPr id="24" name="Graphic 23" descr="Internet with solid fill">
+            <a:extLst>
+              <a:ext uri="{FF2B5EF4-FFF2-40B4-BE49-F238E27FC236}">
+                <a16:creationId xmlns:a16="http://schemas.microsoft.com/office/drawing/2014/main" id="{4541C7BA-746F-38CF-F92E-95DF75FA25F6}"/>
+              </a:ext>
+            </a:extLst>
+          </p:cNvPr>
+          <p:cNvPicPr>
+            <a:picLocks noChangeAspect="1"/>
+          </p:cNvPicPr>
+          <p:nvPr/>
+        </p:nvPicPr>
+        <p:blipFill>
+          <a:blip r:embed="rId8">
+            <a:extLst>
+              <a:ext uri="{96DAC541-7B7A-43D3-8B79-37D633B846F1}">
+                <asvg:svgBlip xmlns:asvg="http://schemas.microsoft.com/office/drawing/2016/SVG/main" r:embed="rId9"/>
+              </a:ext>
+            </a:extLst>
+          </a:blip>
+          <a:stretch>
+            <a:fillRect/>
+          </a:stretch>
+        </p:blipFill>
+        <p:spPr>
+          <a:xfrm>
+            <a:off x="3884446" y="2471516"/>
+            <a:ext cx="518160" cy="518160"/>
+          </a:xfrm>
+          <a:prstGeom prst="rect">
+            <a:avLst/>
+          </a:prstGeom>
+        </p:spPr>
+      </p:pic>
+      <p:sp>
+        <p:nvSpPr>
+          <p:cNvPr id="26" name="Rectangle: Rounded Corners 25">
+            <a:extLst>
+              <a:ext uri="{FF2B5EF4-FFF2-40B4-BE49-F238E27FC236}">
+                <a16:creationId xmlns:a16="http://schemas.microsoft.com/office/drawing/2014/main" id="{338964B6-F967-8541-0A3F-DCAD72F59281}"/>
+              </a:ext>
+            </a:extLst>
+          </p:cNvPr>
+          <p:cNvSpPr/>
+          <p:nvPr/>
+        </p:nvSpPr>
+        <p:spPr>
+          <a:xfrm>
+            <a:off x="2140796" y="3072061"/>
+            <a:ext cx="1716785" cy="417900"/>
+          </a:xfrm>
+          <a:prstGeom prst="roundRect">
+            <a:avLst>
+              <a:gd name="adj" fmla="val 2632"/>
+            </a:avLst>
+          </a:prstGeom>
+          <a:solidFill>
+            <a:schemeClr val="accent6">
+              <a:lumMod val="75000"/>
+              <a:alpha val="35000"/>
+            </a:schemeClr>
+          </a:solidFill>
+          <a:ln>
+            <a:noFill/>
+          </a:ln>
+        </p:spPr>
+        <p:style>
+          <a:lnRef idx="2">
+            <a:schemeClr val="accent1">
+              <a:shade val="15000"/>
+            </a:schemeClr>
+          </a:lnRef>
+          <a:fillRef idx="1">
+            <a:schemeClr val="accent1"/>
+          </a:fillRef>
+          <a:effectRef idx="0">
+            <a:schemeClr val="accent1"/>
+          </a:effectRef>
+          <a:fontRef idx="minor">
+            <a:schemeClr val="lt1"/>
+          </a:fontRef>
+        </p:style>
+        <p:txBody>
+          <a:bodyPr rtlCol="0" anchor="ctr"/>
+          <a:lstStyle/>
+          <a:p>
+            <a:pPr algn="ctr"/>
+            <a:r>
+              <a:rPr lang="en-US" sz="1400" dirty="0">
+                <a:solidFill>
+                  <a:schemeClr val="tx1">
+                    <a:lumMod val="85000"/>
+                    <a:lumOff val="15000"/>
+                  </a:schemeClr>
+                </a:solidFill>
+              </a:rPr>
+              <a:t>Cloudflared Service</a:t>
+            </a:r>
+          </a:p>
+        </p:txBody>
+      </p:sp>
+      <p:cxnSp>
+        <p:nvCxnSpPr>
+          <p:cNvPr id="27" name="Straight Arrow Connector 26">
+            <a:extLst>
+              <a:ext uri="{FF2B5EF4-FFF2-40B4-BE49-F238E27FC236}">
+                <a16:creationId xmlns:a16="http://schemas.microsoft.com/office/drawing/2014/main" id="{A2BB8C14-8EE0-5BB7-098B-A0E03FF233B3}"/>
+              </a:ext>
+            </a:extLst>
+          </p:cNvPr>
+          <p:cNvCxnSpPr>
+            <a:cxnSpLocks/>
+            <a:stCxn id="17" idx="2"/>
+            <a:endCxn id="26" idx="0"/>
+          </p:cNvCxnSpPr>
+          <p:nvPr/>
+        </p:nvCxnSpPr>
+        <p:spPr>
+          <a:xfrm>
+            <a:off x="2976630" y="1474940"/>
+            <a:ext cx="22559" cy="1597121"/>
+          </a:xfrm>
+          <a:prstGeom prst="straightConnector1">
+            <a:avLst/>
+          </a:prstGeom>
+          <a:ln>
+            <a:tailEnd type="triangle"/>
+          </a:ln>
+        </p:spPr>
+        <p:style>
+          <a:lnRef idx="2">
+            <a:schemeClr val="accent1"/>
+          </a:lnRef>
+          <a:fillRef idx="0">
+            <a:schemeClr val="accent1"/>
+          </a:fillRef>
+          <a:effectRef idx="1">
+            <a:schemeClr val="accent1"/>
+          </a:effectRef>
+          <a:fontRef idx="minor">
+            <a:schemeClr val="tx1"/>
+          </a:fontRef>
+        </p:style>
+      </p:cxnSp>
+      <p:sp>
+        <p:nvSpPr>
+          <p:cNvPr id="28" name="Rectangle: Rounded Corners 27">
+            <a:extLst>
+              <a:ext uri="{FF2B5EF4-FFF2-40B4-BE49-F238E27FC236}">
+                <a16:creationId xmlns:a16="http://schemas.microsoft.com/office/drawing/2014/main" id="{4DA29C93-0B81-A653-D0AF-3E0D4B259D73}"/>
+              </a:ext>
+            </a:extLst>
+          </p:cNvPr>
+          <p:cNvSpPr/>
+          <p:nvPr/>
+        </p:nvSpPr>
+        <p:spPr>
+          <a:xfrm>
+            <a:off x="4379215" y="3072061"/>
+            <a:ext cx="1716785" cy="431962"/>
+          </a:xfrm>
+          <a:prstGeom prst="roundRect">
+            <a:avLst>
+              <a:gd name="adj" fmla="val 2632"/>
+            </a:avLst>
+          </a:prstGeom>
+          <a:solidFill>
+            <a:schemeClr val="accent6">
+              <a:lumMod val="75000"/>
+              <a:alpha val="35000"/>
+            </a:schemeClr>
+          </a:solidFill>
+          <a:ln>
+            <a:noFill/>
+          </a:ln>
+        </p:spPr>
+        <p:style>
+          <a:lnRef idx="2">
+            <a:schemeClr val="accent1">
+              <a:shade val="15000"/>
+            </a:schemeClr>
+          </a:lnRef>
+          <a:fillRef idx="1">
+            <a:schemeClr val="accent1"/>
+          </a:fillRef>
+          <a:effectRef idx="0">
+            <a:schemeClr val="accent1"/>
+          </a:effectRef>
+          <a:fontRef idx="minor">
+            <a:schemeClr val="lt1"/>
+          </a:fontRef>
+        </p:style>
+        <p:txBody>
+          <a:bodyPr rtlCol="0" anchor="ctr"/>
+          <a:lstStyle/>
+          <a:p>
+            <a:pPr algn="ctr"/>
+            <a:r>
+              <a:rPr lang="en-US" sz="1400" dirty="0">
+                <a:solidFill>
+                  <a:schemeClr val="tx1">
+                    <a:lumMod val="85000"/>
+                    <a:lumOff val="15000"/>
+                  </a:schemeClr>
+                </a:solidFill>
+              </a:rPr>
+              <a:t>Home Assistant</a:t>
+            </a:r>
+          </a:p>
+        </p:txBody>
+      </p:sp>
+      <p:cxnSp>
+        <p:nvCxnSpPr>
+          <p:cNvPr id="34" name="Connector: Elbow 33">
+            <a:extLst>
+              <a:ext uri="{FF2B5EF4-FFF2-40B4-BE49-F238E27FC236}">
+                <a16:creationId xmlns:a16="http://schemas.microsoft.com/office/drawing/2014/main" id="{EA3E9AAD-45AD-E4A6-5F7D-9EF16800C46B}"/>
+              </a:ext>
+            </a:extLst>
+          </p:cNvPr>
+          <p:cNvCxnSpPr>
+            <a:cxnSpLocks/>
+            <a:stCxn id="26" idx="3"/>
+            <a:endCxn id="28" idx="1"/>
+          </p:cNvCxnSpPr>
+          <p:nvPr/>
+        </p:nvCxnSpPr>
+        <p:spPr>
+          <a:xfrm>
+            <a:off x="3857581" y="3281011"/>
+            <a:ext cx="521634" cy="7031"/>
+          </a:xfrm>
+          <a:prstGeom prst="bentConnector3">
+            <a:avLst>
+              <a:gd name="adj1" fmla="val 50000"/>
+            </a:avLst>
+          </a:prstGeom>
+          <a:ln>
+            <a:tailEnd type="triangle"/>
+          </a:ln>
+        </p:spPr>
+        <p:style>
+          <a:lnRef idx="2">
+            <a:schemeClr val="accent1"/>
+          </a:lnRef>
+          <a:fillRef idx="0">
+            <a:schemeClr val="accent1"/>
+          </a:fillRef>
+          <a:effectRef idx="1">
+            <a:schemeClr val="accent1"/>
+          </a:effectRef>
+          <a:fontRef idx="minor">
+            <a:schemeClr val="tx1"/>
+          </a:fontRef>
+        </p:style>
+      </p:cxnSp>
+      <p:pic>
+        <p:nvPicPr>
+          <p:cNvPr id="36" name="Graphic 35" descr="Users with solid fill">
+            <a:extLst>
+              <a:ext uri="{FF2B5EF4-FFF2-40B4-BE49-F238E27FC236}">
+                <a16:creationId xmlns:a16="http://schemas.microsoft.com/office/drawing/2014/main" id="{77B9AE90-67B7-968C-7AD6-1712D014148C}"/>
+              </a:ext>
+            </a:extLst>
+          </p:cNvPr>
+          <p:cNvPicPr>
+            <a:picLocks noChangeAspect="1"/>
+          </p:cNvPicPr>
+          <p:nvPr/>
+        </p:nvPicPr>
+        <p:blipFill>
+          <a:blip r:embed="rId4">
+            <a:extLst>
+              <a:ext uri="{96DAC541-7B7A-43D3-8B79-37D633B846F1}">
+                <asvg:svgBlip xmlns:asvg="http://schemas.microsoft.com/office/drawing/2016/SVG/main" r:embed="rId5"/>
+              </a:ext>
+            </a:extLst>
+          </a:blip>
+          <a:stretch>
+            <a:fillRect/>
+          </a:stretch>
+        </p:blipFill>
+        <p:spPr>
+          <a:xfrm>
+            <a:off x="9511487" y="2589623"/>
+            <a:ext cx="914400" cy="914400"/>
+          </a:xfrm>
+          <a:prstGeom prst="rect">
+            <a:avLst/>
+          </a:prstGeom>
+        </p:spPr>
+      </p:pic>
+      <p:sp>
+        <p:nvSpPr>
+          <p:cNvPr id="37" name="TextBox 36">
+            <a:extLst>
+              <a:ext uri="{FF2B5EF4-FFF2-40B4-BE49-F238E27FC236}">
+                <a16:creationId xmlns:a16="http://schemas.microsoft.com/office/drawing/2014/main" id="{483C3CC7-C95F-41C6-5F0A-CF386816F26D}"/>
+              </a:ext>
+            </a:extLst>
+          </p:cNvPr>
+          <p:cNvSpPr txBox="1"/>
+          <p:nvPr/>
+        </p:nvSpPr>
+        <p:spPr>
+          <a:xfrm>
+            <a:off x="9703955" y="3359196"/>
+            <a:ext cx="591829" cy="461665"/>
+          </a:xfrm>
+          <a:prstGeom prst="rect">
+            <a:avLst/>
+          </a:prstGeom>
+          <a:noFill/>
+        </p:spPr>
+        <p:txBody>
+          <a:bodyPr wrap="none" rtlCol="0">
+            <a:spAutoFit/>
+          </a:bodyPr>
+          <a:lstStyle/>
+          <a:p>
+            <a:pPr algn="ctr"/>
+            <a:r>
+              <a:rPr lang="en-US" sz="1200" dirty="0"/>
+              <a:t>Home</a:t>
+            </a:r>
+          </a:p>
+          <a:p>
+            <a:pPr algn="ctr"/>
+            <a:r>
+              <a:rPr lang="en-US" sz="1200" dirty="0"/>
+              <a:t>Users</a:t>
+            </a:r>
+          </a:p>
+        </p:txBody>
+      </p:sp>
+      <p:cxnSp>
+        <p:nvCxnSpPr>
+          <p:cNvPr id="38" name="Straight Arrow Connector 37">
+            <a:extLst>
+              <a:ext uri="{FF2B5EF4-FFF2-40B4-BE49-F238E27FC236}">
+                <a16:creationId xmlns:a16="http://schemas.microsoft.com/office/drawing/2014/main" id="{80DB13DB-9C22-B0B4-A929-339FDCC0BE0E}"/>
+              </a:ext>
+            </a:extLst>
+          </p:cNvPr>
+          <p:cNvCxnSpPr>
+            <a:cxnSpLocks/>
+          </p:cNvCxnSpPr>
+          <p:nvPr/>
+        </p:nvCxnSpPr>
+        <p:spPr>
+          <a:xfrm flipH="1">
+            <a:off x="6313170" y="3248258"/>
+            <a:ext cx="3031998" cy="0"/>
+          </a:xfrm>
+          <a:prstGeom prst="straightConnector1">
+            <a:avLst/>
+          </a:prstGeom>
+          <a:ln>
+            <a:tailEnd type="triangle"/>
+          </a:ln>
+        </p:spPr>
+        <p:style>
+          <a:lnRef idx="2">
+            <a:schemeClr val="accent1"/>
+          </a:lnRef>
+          <a:fillRef idx="0">
+            <a:schemeClr val="accent1"/>
+          </a:fillRef>
+          <a:effectRef idx="1">
+            <a:schemeClr val="accent1"/>
+          </a:effectRef>
+          <a:fontRef idx="minor">
+            <a:schemeClr val="tx1"/>
+          </a:fontRef>
+        </p:style>
+      </p:cxnSp>
+      <p:sp>
+        <p:nvSpPr>
+          <p:cNvPr id="39" name="TextBox 38">
+            <a:extLst>
+              <a:ext uri="{FF2B5EF4-FFF2-40B4-BE49-F238E27FC236}">
+                <a16:creationId xmlns:a16="http://schemas.microsoft.com/office/drawing/2014/main" id="{28AC9824-9194-6FDA-B081-CE07F70C093E}"/>
+              </a:ext>
+            </a:extLst>
+          </p:cNvPr>
+          <p:cNvSpPr txBox="1"/>
+          <p:nvPr/>
+        </p:nvSpPr>
+        <p:spPr>
+          <a:xfrm>
+            <a:off x="7137488" y="3242289"/>
+            <a:ext cx="1457643" cy="307777"/>
+          </a:xfrm>
+          <a:prstGeom prst="rect">
+            <a:avLst/>
+          </a:prstGeom>
+          <a:noFill/>
+        </p:spPr>
+        <p:txBody>
+          <a:bodyPr wrap="square" rtlCol="0">
+            <a:spAutoFit/>
+          </a:bodyPr>
+          <a:lstStyle/>
+          <a:p>
+            <a:pPr algn="ctr"/>
+            <a:r>
+              <a:rPr lang="en-US" sz="1400" dirty="0"/>
+              <a:t>Local IP address</a:t>
+            </a:r>
+          </a:p>
+        </p:txBody>
+      </p:sp>
+      <p:pic>
+        <p:nvPicPr>
+          <p:cNvPr id="60" name="Graphic 59">
+            <a:extLst>
+              <a:ext uri="{FF2B5EF4-FFF2-40B4-BE49-F238E27FC236}">
+                <a16:creationId xmlns:a16="http://schemas.microsoft.com/office/drawing/2014/main" id="{0B172762-84BA-E06F-1510-73E71771C1E4}"/>
+              </a:ext>
+            </a:extLst>
+          </p:cNvPr>
+          <p:cNvPicPr>
+            <a:picLocks noChangeAspect="1"/>
+          </p:cNvPicPr>
+          <p:nvPr/>
+        </p:nvPicPr>
+        <p:blipFill>
+          <a:blip r:embed="rId10">
+            <a:extLst>
+              <a:ext uri="{96DAC541-7B7A-43D3-8B79-37D633B846F1}">
+                <asvg:svgBlip xmlns:asvg="http://schemas.microsoft.com/office/drawing/2016/SVG/main" r:embed="rId11"/>
+              </a:ext>
+            </a:extLst>
+          </a:blip>
+          <a:stretch>
+            <a:fillRect/>
+          </a:stretch>
+        </p:blipFill>
+        <p:spPr>
+          <a:xfrm>
+            <a:off x="4443044" y="3820861"/>
+            <a:ext cx="359395" cy="359395"/>
+          </a:xfrm>
+          <a:prstGeom prst="rect">
+            <a:avLst/>
+          </a:prstGeom>
+        </p:spPr>
+      </p:pic>
+      <p:sp>
+        <p:nvSpPr>
+          <p:cNvPr id="61" name="TextBox 60">
+            <a:extLst>
+              <a:ext uri="{FF2B5EF4-FFF2-40B4-BE49-F238E27FC236}">
+                <a16:creationId xmlns:a16="http://schemas.microsoft.com/office/drawing/2014/main" id="{41F68E47-08C8-F839-B719-166488CE4EC2}"/>
+              </a:ext>
+            </a:extLst>
+          </p:cNvPr>
+          <p:cNvSpPr txBox="1"/>
+          <p:nvPr/>
+        </p:nvSpPr>
+        <p:spPr>
+          <a:xfrm>
+            <a:off x="4192530" y="4147435"/>
+            <a:ext cx="870751" cy="261610"/>
+          </a:xfrm>
+          <a:prstGeom prst="rect">
+            <a:avLst/>
+          </a:prstGeom>
+          <a:noFill/>
+        </p:spPr>
+        <p:txBody>
+          <a:bodyPr wrap="none" rtlCol="0">
+            <a:spAutoFit/>
+          </a:bodyPr>
+          <a:lstStyle/>
+          <a:p>
+            <a:r>
+              <a:rPr lang="en-US" sz="1100" dirty="0">
+                <a:solidFill>
+                  <a:srgbClr val="FF0000"/>
+                </a:solidFill>
+              </a:rPr>
+              <a:t>Zigbee Hub</a:t>
+            </a:r>
+          </a:p>
+        </p:txBody>
+      </p:sp>
+      <p:sp>
+        <p:nvSpPr>
+          <p:cNvPr id="63" name="TextBox 62">
+            <a:extLst>
+              <a:ext uri="{FF2B5EF4-FFF2-40B4-BE49-F238E27FC236}">
+                <a16:creationId xmlns:a16="http://schemas.microsoft.com/office/drawing/2014/main" id="{9384AC28-2BA8-E506-9D99-8E8CDEA8D872}"/>
+              </a:ext>
+            </a:extLst>
+          </p:cNvPr>
+          <p:cNvSpPr txBox="1"/>
+          <p:nvPr/>
+        </p:nvSpPr>
+        <p:spPr>
+          <a:xfrm>
+            <a:off x="5588573" y="4147435"/>
+            <a:ext cx="785793" cy="261610"/>
+          </a:xfrm>
+          <a:prstGeom prst="rect">
+            <a:avLst/>
+          </a:prstGeom>
+          <a:noFill/>
+        </p:spPr>
+        <p:txBody>
+          <a:bodyPr wrap="none" rtlCol="0">
+            <a:spAutoFit/>
+          </a:bodyPr>
+          <a:lstStyle/>
+          <a:p>
+            <a:r>
+              <a:rPr lang="en-US" sz="1100" dirty="0">
+                <a:solidFill>
+                  <a:srgbClr val="0070C0"/>
+                </a:solidFill>
+              </a:rPr>
+              <a:t>Wi-Fi Hub</a:t>
+            </a:r>
+          </a:p>
+        </p:txBody>
+      </p:sp>
+      <p:pic>
+        <p:nvPicPr>
+          <p:cNvPr id="65" name="Graphic 64" descr="Network outline">
+            <a:extLst>
+              <a:ext uri="{FF2B5EF4-FFF2-40B4-BE49-F238E27FC236}">
+                <a16:creationId xmlns:a16="http://schemas.microsoft.com/office/drawing/2014/main" id="{8052292F-65B4-93E1-A43E-388E3D02DEBA}"/>
+              </a:ext>
+            </a:extLst>
+          </p:cNvPr>
+          <p:cNvPicPr>
+            <a:picLocks noChangeAspect="1"/>
+          </p:cNvPicPr>
+          <p:nvPr/>
+        </p:nvPicPr>
+        <p:blipFill>
+          <a:blip r:embed="rId12">
+            <a:extLst>
+              <a:ext uri="{96DAC541-7B7A-43D3-8B79-37D633B846F1}">
+                <asvg:svgBlip xmlns:asvg="http://schemas.microsoft.com/office/drawing/2016/SVG/main" r:embed="rId13"/>
+              </a:ext>
+            </a:extLst>
+          </a:blip>
+          <a:stretch>
+            <a:fillRect/>
+          </a:stretch>
+        </p:blipFill>
+        <p:spPr>
+          <a:xfrm>
+            <a:off x="5692048" y="3708147"/>
+            <a:ext cx="489066" cy="489066"/>
+          </a:xfrm>
+          <a:prstGeom prst="rect">
+            <a:avLst/>
+          </a:prstGeom>
+        </p:spPr>
+      </p:pic>
+      <p:cxnSp>
+        <p:nvCxnSpPr>
+          <p:cNvPr id="72" name="Connector: Curved 71">
+            <a:extLst>
+              <a:ext uri="{FF2B5EF4-FFF2-40B4-BE49-F238E27FC236}">
+                <a16:creationId xmlns:a16="http://schemas.microsoft.com/office/drawing/2014/main" id="{B84657C8-A769-4D08-CE2D-1B7E9D1D2880}"/>
+              </a:ext>
+            </a:extLst>
+          </p:cNvPr>
+          <p:cNvCxnSpPr>
+            <a:cxnSpLocks/>
+            <a:stCxn id="28" idx="2"/>
+            <a:endCxn id="60" idx="0"/>
+          </p:cNvCxnSpPr>
+          <p:nvPr/>
+        </p:nvCxnSpPr>
+        <p:spPr>
+          <a:xfrm rot="5400000">
+            <a:off x="4771756" y="3355009"/>
+            <a:ext cx="316838" cy="614866"/>
+          </a:xfrm>
+          <a:prstGeom prst="curvedConnector3">
+            <a:avLst>
+              <a:gd name="adj1" fmla="val 50000"/>
+            </a:avLst>
+          </a:prstGeom>
+          <a:ln>
+            <a:headEnd type="triangle"/>
+            <a:tailEnd type="triangle"/>
+          </a:ln>
+        </p:spPr>
+        <p:style>
+          <a:lnRef idx="2">
+            <a:schemeClr val="accent1"/>
+          </a:lnRef>
+          <a:fillRef idx="0">
+            <a:schemeClr val="accent1"/>
+          </a:fillRef>
+          <a:effectRef idx="1">
+            <a:schemeClr val="accent1"/>
+          </a:effectRef>
+          <a:fontRef idx="minor">
+            <a:schemeClr val="tx1"/>
+          </a:fontRef>
+        </p:style>
+      </p:cxnSp>
+      <p:cxnSp>
+        <p:nvCxnSpPr>
+          <p:cNvPr id="75" name="Connector: Curved 74">
+            <a:extLst>
+              <a:ext uri="{FF2B5EF4-FFF2-40B4-BE49-F238E27FC236}">
+                <a16:creationId xmlns:a16="http://schemas.microsoft.com/office/drawing/2014/main" id="{0AA90EE3-484A-2922-4475-0E8431FB89AE}"/>
+              </a:ext>
+            </a:extLst>
+          </p:cNvPr>
+          <p:cNvCxnSpPr>
+            <a:stCxn id="28" idx="2"/>
+            <a:endCxn id="65" idx="0"/>
+          </p:cNvCxnSpPr>
+          <p:nvPr/>
+        </p:nvCxnSpPr>
+        <p:spPr>
+          <a:xfrm rot="16200000" flipH="1">
+            <a:off x="5485032" y="3256598"/>
+            <a:ext cx="204124" cy="698973"/>
+          </a:xfrm>
+          <a:prstGeom prst="curvedConnector3">
+            <a:avLst/>
+          </a:prstGeom>
+          <a:ln>
+            <a:headEnd type="triangle"/>
+            <a:tailEnd type="triangle"/>
+          </a:ln>
+        </p:spPr>
+        <p:style>
+          <a:lnRef idx="2">
+            <a:schemeClr val="accent1"/>
+          </a:lnRef>
+          <a:fillRef idx="0">
+            <a:schemeClr val="accent1"/>
+          </a:fillRef>
+          <a:effectRef idx="1">
+            <a:schemeClr val="accent1"/>
+          </a:effectRef>
+          <a:fontRef idx="minor">
+            <a:schemeClr val="tx1"/>
+          </a:fontRef>
+        </p:style>
+      </p:cxnSp>
+      <p:pic>
+        <p:nvPicPr>
+          <p:cNvPr id="77" name="Graphic 76" descr="Stream outline">
+            <a:extLst>
+              <a:ext uri="{FF2B5EF4-FFF2-40B4-BE49-F238E27FC236}">
+                <a16:creationId xmlns:a16="http://schemas.microsoft.com/office/drawing/2014/main" id="{05BD89E5-7F0E-16AE-F7D4-DDED5A5CEDED}"/>
+              </a:ext>
+            </a:extLst>
+          </p:cNvPr>
+          <p:cNvPicPr>
+            <a:picLocks noChangeAspect="1"/>
+          </p:cNvPicPr>
+          <p:nvPr/>
+        </p:nvPicPr>
+        <p:blipFill>
+          <a:blip r:embed="rId14">
+            <a:extLst>
+              <a:ext uri="{96DAC541-7B7A-43D3-8B79-37D633B846F1}">
+                <asvg:svgBlip xmlns:asvg="http://schemas.microsoft.com/office/drawing/2016/SVG/main" r:embed="rId15"/>
+              </a:ext>
+            </a:extLst>
+          </a:blip>
+          <a:stretch>
+            <a:fillRect/>
+          </a:stretch>
+        </p:blipFill>
+        <p:spPr>
+          <a:xfrm>
+            <a:off x="6936080" y="4609910"/>
+            <a:ext cx="560120" cy="560120"/>
+          </a:xfrm>
+          <a:prstGeom prst="rect">
+            <a:avLst/>
+          </a:prstGeom>
+        </p:spPr>
+      </p:pic>
+      <p:sp>
+        <p:nvSpPr>
+          <p:cNvPr id="81" name="TextBox 80">
+            <a:extLst>
+              <a:ext uri="{FF2B5EF4-FFF2-40B4-BE49-F238E27FC236}">
+                <a16:creationId xmlns:a16="http://schemas.microsoft.com/office/drawing/2014/main" id="{C0D27F6B-E24D-E2C3-3FCD-916C5CDC9554}"/>
+              </a:ext>
+            </a:extLst>
+          </p:cNvPr>
+          <p:cNvSpPr txBox="1"/>
+          <p:nvPr/>
+        </p:nvSpPr>
+        <p:spPr>
+          <a:xfrm>
+            <a:off x="7460800" y="4775202"/>
+            <a:ext cx="1537600" cy="261610"/>
+          </a:xfrm>
+          <a:prstGeom prst="rect">
+            <a:avLst/>
+          </a:prstGeom>
+          <a:noFill/>
+        </p:spPr>
+        <p:txBody>
+          <a:bodyPr wrap="none" rtlCol="0">
+            <a:spAutoFit/>
+          </a:bodyPr>
+          <a:lstStyle/>
+          <a:p>
+            <a:r>
+              <a:rPr lang="en-US" sz="1100" dirty="0"/>
+              <a:t>Entertainment System</a:t>
+            </a:r>
+          </a:p>
+        </p:txBody>
+      </p:sp>
+      <p:sp>
+        <p:nvSpPr>
+          <p:cNvPr id="82" name="TextBox 81">
+            <a:extLst>
+              <a:ext uri="{FF2B5EF4-FFF2-40B4-BE49-F238E27FC236}">
+                <a16:creationId xmlns:a16="http://schemas.microsoft.com/office/drawing/2014/main" id="{3F0DF958-8A6A-72D3-2DC4-4B324B60ECCA}"/>
+              </a:ext>
+            </a:extLst>
+          </p:cNvPr>
+          <p:cNvSpPr txBox="1"/>
+          <p:nvPr/>
+        </p:nvSpPr>
+        <p:spPr>
+          <a:xfrm>
+            <a:off x="7460800" y="5335322"/>
+            <a:ext cx="1755609" cy="261610"/>
+          </a:xfrm>
+          <a:prstGeom prst="rect">
+            <a:avLst/>
+          </a:prstGeom>
+          <a:noFill/>
+        </p:spPr>
+        <p:txBody>
+          <a:bodyPr wrap="none" rtlCol="0">
+            <a:spAutoFit/>
+          </a:bodyPr>
+          <a:lstStyle/>
+          <a:p>
+            <a:r>
+              <a:rPr lang="en-US" sz="1100" dirty="0"/>
+              <a:t>Camera / Security System</a:t>
+            </a:r>
+          </a:p>
+        </p:txBody>
+      </p:sp>
+      <p:pic>
+        <p:nvPicPr>
+          <p:cNvPr id="84" name="Graphic 83" descr="Web cam with solid fill">
+            <a:extLst>
+              <a:ext uri="{FF2B5EF4-FFF2-40B4-BE49-F238E27FC236}">
+                <a16:creationId xmlns:a16="http://schemas.microsoft.com/office/drawing/2014/main" id="{352C2E11-E5F9-6793-5328-9985B1C0A241}"/>
+              </a:ext>
+            </a:extLst>
+          </p:cNvPr>
+          <p:cNvPicPr>
+            <a:picLocks noChangeAspect="1"/>
+          </p:cNvPicPr>
+          <p:nvPr/>
+        </p:nvPicPr>
+        <p:blipFill>
+          <a:blip r:embed="rId16">
+            <a:extLst>
+              <a:ext uri="{96DAC541-7B7A-43D3-8B79-37D633B846F1}">
+                <asvg:svgBlip xmlns:asvg="http://schemas.microsoft.com/office/drawing/2016/SVG/main" r:embed="rId17"/>
+              </a:ext>
+            </a:extLst>
+          </a:blip>
+          <a:stretch>
+            <a:fillRect/>
+          </a:stretch>
+        </p:blipFill>
+        <p:spPr>
+          <a:xfrm>
+            <a:off x="7066058" y="5202104"/>
+            <a:ext cx="430142" cy="430142"/>
+          </a:xfrm>
+          <a:prstGeom prst="rect">
+            <a:avLst/>
+          </a:prstGeom>
+        </p:spPr>
+      </p:pic>
+      <p:pic>
+        <p:nvPicPr>
+          <p:cNvPr id="1026" name="Picture 2" descr="Thermostat Icons - Free SVG &amp; PNG Thermostat Images - Noun Project">
+            <a:extLst>
+              <a:ext uri="{FF2B5EF4-FFF2-40B4-BE49-F238E27FC236}">
+                <a16:creationId xmlns:a16="http://schemas.microsoft.com/office/drawing/2014/main" id="{DE1CF515-9E60-FE88-EED5-8F2BBB82A385}"/>
+              </a:ext>
+            </a:extLst>
+          </p:cNvPr>
+          <p:cNvPicPr>
+            <a:picLocks noChangeAspect="1" noChangeArrowheads="1"/>
+          </p:cNvPicPr>
+          <p:nvPr/>
+        </p:nvPicPr>
+        <p:blipFill>
+          <a:blip r:embed="rId18">
+            <a:extLst>
+              <a:ext uri="{28A0092B-C50C-407E-A947-70E740481C1C}">
+                <a14:useLocalDpi xmlns:a14="http://schemas.microsoft.com/office/drawing/2010/main" val="0"/>
+              </a:ext>
+            </a:extLst>
+          </a:blip>
+          <a:srcRect/>
+          <a:stretch>
+            <a:fillRect/>
+          </a:stretch>
+        </p:blipFill>
+        <p:spPr bwMode="auto">
+          <a:xfrm>
+            <a:off x="3081291" y="4641522"/>
+            <a:ext cx="591829" cy="591829"/>
+          </a:xfrm>
+          <a:prstGeom prst="rect">
+            <a:avLst/>
+          </a:prstGeom>
+          <a:noFill/>
+          <a:extLst>
+            <a:ext uri="{909E8E84-426E-40DD-AFC4-6F175D3DCCD1}">
+              <a14:hiddenFill xmlns:a14="http://schemas.microsoft.com/office/drawing/2010/main">
+                <a:solidFill>
+                  <a:srgbClr val="FFFFFF"/>
+                </a:solidFill>
+              </a14:hiddenFill>
+            </a:ext>
+          </a:extLst>
+        </p:spPr>
+      </p:pic>
+      <p:sp>
+        <p:nvSpPr>
+          <p:cNvPr id="85" name="TextBox 84">
+            <a:extLst>
+              <a:ext uri="{FF2B5EF4-FFF2-40B4-BE49-F238E27FC236}">
+                <a16:creationId xmlns:a16="http://schemas.microsoft.com/office/drawing/2014/main" id="{871A3C52-6486-60EB-ADA9-A515EA7A1F08}"/>
+              </a:ext>
+            </a:extLst>
+          </p:cNvPr>
+          <p:cNvSpPr txBox="1"/>
+          <p:nvPr/>
+        </p:nvSpPr>
+        <p:spPr>
+          <a:xfrm>
+            <a:off x="1671324" y="4775202"/>
+            <a:ext cx="1454244" cy="261610"/>
+          </a:xfrm>
+          <a:prstGeom prst="rect">
+            <a:avLst/>
+          </a:prstGeom>
+          <a:noFill/>
+        </p:spPr>
+        <p:txBody>
+          <a:bodyPr wrap="none" rtlCol="0">
+            <a:spAutoFit/>
+          </a:bodyPr>
+          <a:lstStyle/>
+          <a:p>
+            <a:r>
+              <a:rPr lang="en-US" sz="1100" dirty="0"/>
+              <a:t>Temperature Control</a:t>
+            </a:r>
+          </a:p>
+        </p:txBody>
+      </p:sp>
+      <p:pic>
+        <p:nvPicPr>
+          <p:cNvPr id="1028" name="Picture 4" descr="Smart Sensor Icons - Free SVG &amp; PNG Smart Sensor Images - Noun Project">
+            <a:extLst>
+              <a:ext uri="{FF2B5EF4-FFF2-40B4-BE49-F238E27FC236}">
+                <a16:creationId xmlns:a16="http://schemas.microsoft.com/office/drawing/2014/main" id="{C1087E61-B475-6D99-B3BD-8F20F3A3FEBD}"/>
+              </a:ext>
+            </a:extLst>
+          </p:cNvPr>
+          <p:cNvPicPr>
+            <a:picLocks noChangeAspect="1" noChangeArrowheads="1"/>
+          </p:cNvPicPr>
+          <p:nvPr/>
+        </p:nvPicPr>
+        <p:blipFill>
+          <a:blip r:embed="rId19">
+            <a:extLst>
+              <a:ext uri="{28A0092B-C50C-407E-A947-70E740481C1C}">
+                <a14:useLocalDpi xmlns:a14="http://schemas.microsoft.com/office/drawing/2010/main" val="0"/>
+              </a:ext>
+            </a:extLst>
+          </a:blip>
+          <a:srcRect/>
+          <a:stretch>
+            <a:fillRect/>
+          </a:stretch>
+        </p:blipFill>
+        <p:spPr bwMode="auto">
+          <a:xfrm>
+            <a:off x="3081291" y="5330445"/>
+            <a:ext cx="560639" cy="560639"/>
+          </a:xfrm>
+          <a:prstGeom prst="rect">
+            <a:avLst/>
+          </a:prstGeom>
+          <a:noFill/>
+          <a:extLst>
+            <a:ext uri="{909E8E84-426E-40DD-AFC4-6F175D3DCCD1}">
+              <a14:hiddenFill xmlns:a14="http://schemas.microsoft.com/office/drawing/2010/main">
+                <a:solidFill>
+                  <a:srgbClr val="FFFFFF"/>
+                </a:solidFill>
+              </a14:hiddenFill>
+            </a:ext>
+          </a:extLst>
+        </p:spPr>
+      </p:pic>
+      <p:sp>
+        <p:nvSpPr>
+          <p:cNvPr id="86" name="TextBox 85">
+            <a:extLst>
+              <a:ext uri="{FF2B5EF4-FFF2-40B4-BE49-F238E27FC236}">
+                <a16:creationId xmlns:a16="http://schemas.microsoft.com/office/drawing/2014/main" id="{AA2BCB0D-7516-63C3-57CC-A14CADA4E655}"/>
+              </a:ext>
+            </a:extLst>
+          </p:cNvPr>
+          <p:cNvSpPr txBox="1"/>
+          <p:nvPr/>
+        </p:nvSpPr>
+        <p:spPr>
+          <a:xfrm>
+            <a:off x="1745062" y="5448701"/>
+            <a:ext cx="1380506" cy="261610"/>
+          </a:xfrm>
+          <a:prstGeom prst="rect">
+            <a:avLst/>
+          </a:prstGeom>
+          <a:noFill/>
+        </p:spPr>
+        <p:txBody>
+          <a:bodyPr wrap="none" rtlCol="0">
+            <a:spAutoFit/>
+          </a:bodyPr>
+          <a:lstStyle/>
+          <a:p>
+            <a:r>
+              <a:rPr lang="en-US" sz="1100" dirty="0"/>
+              <a:t>Sensors / Actuators</a:t>
+            </a:r>
+          </a:p>
+        </p:txBody>
+      </p:sp>
+      <p:sp>
+        <p:nvSpPr>
+          <p:cNvPr id="87" name="Right Brace 86">
+            <a:extLst>
+              <a:ext uri="{FF2B5EF4-FFF2-40B4-BE49-F238E27FC236}">
+                <a16:creationId xmlns:a16="http://schemas.microsoft.com/office/drawing/2014/main" id="{4BD53034-7DBD-9562-F963-B3D1275A6EBF}"/>
+              </a:ext>
+            </a:extLst>
+          </p:cNvPr>
+          <p:cNvSpPr/>
+          <p:nvPr/>
+        </p:nvSpPr>
+        <p:spPr>
+          <a:xfrm>
+            <a:off x="3678374" y="4641522"/>
+            <a:ext cx="274862" cy="1198738"/>
+          </a:xfrm>
+          <a:prstGeom prst="rightBrace">
+            <a:avLst/>
+          </a:prstGeom>
+        </p:spPr>
+        <p:style>
+          <a:lnRef idx="2">
+            <a:schemeClr val="accent1"/>
+          </a:lnRef>
+          <a:fillRef idx="0">
+            <a:schemeClr val="accent1"/>
+          </a:fillRef>
+          <a:effectRef idx="1">
+            <a:schemeClr val="accent1"/>
+          </a:effectRef>
+          <a:fontRef idx="minor">
+            <a:schemeClr val="tx1"/>
+          </a:fontRef>
+        </p:style>
+        <p:txBody>
+          <a:bodyPr rtlCol="0" anchor="ctr"/>
+          <a:lstStyle/>
+          <a:p>
+            <a:pPr algn="ctr"/>
+            <a:endParaRPr lang="en-US"/>
+          </a:p>
+        </p:txBody>
+      </p:sp>
+      <p:sp>
+        <p:nvSpPr>
+          <p:cNvPr id="88" name="Right Brace 87">
+            <a:extLst>
+              <a:ext uri="{FF2B5EF4-FFF2-40B4-BE49-F238E27FC236}">
+                <a16:creationId xmlns:a16="http://schemas.microsoft.com/office/drawing/2014/main" id="{0150DD36-CC08-58B2-72FE-808A5037F2A8}"/>
+              </a:ext>
+            </a:extLst>
+          </p:cNvPr>
+          <p:cNvSpPr/>
+          <p:nvPr/>
+        </p:nvSpPr>
+        <p:spPr>
+          <a:xfrm rot="10800000">
+            <a:off x="6640126" y="4641522"/>
+            <a:ext cx="274862" cy="1198738"/>
+          </a:xfrm>
+          <a:prstGeom prst="rightBrace">
+            <a:avLst/>
+          </a:prstGeom>
+        </p:spPr>
+        <p:style>
+          <a:lnRef idx="2">
+            <a:schemeClr val="accent1"/>
+          </a:lnRef>
+          <a:fillRef idx="0">
+            <a:schemeClr val="accent1"/>
+          </a:fillRef>
+          <a:effectRef idx="1">
+            <a:schemeClr val="accent1"/>
+          </a:effectRef>
+          <a:fontRef idx="minor">
+            <a:schemeClr val="tx1"/>
+          </a:fontRef>
+        </p:style>
+        <p:txBody>
+          <a:bodyPr rtlCol="0" anchor="ctr"/>
+          <a:lstStyle/>
+          <a:p>
+            <a:pPr algn="ctr"/>
+            <a:endParaRPr lang="en-US"/>
+          </a:p>
+        </p:txBody>
+      </p:sp>
+      <p:cxnSp>
+        <p:nvCxnSpPr>
+          <p:cNvPr id="94" name="Straight Arrow Connector 93">
+            <a:extLst>
+              <a:ext uri="{FF2B5EF4-FFF2-40B4-BE49-F238E27FC236}">
+                <a16:creationId xmlns:a16="http://schemas.microsoft.com/office/drawing/2014/main" id="{144C41DE-3667-8425-238F-9959E8F007D6}"/>
+              </a:ext>
+            </a:extLst>
+          </p:cNvPr>
+          <p:cNvCxnSpPr>
+            <a:endCxn id="88" idx="1"/>
+          </p:cNvCxnSpPr>
+          <p:nvPr/>
+        </p:nvCxnSpPr>
+        <p:spPr>
+          <a:xfrm>
+            <a:off x="5981469" y="4409045"/>
+            <a:ext cx="658656" cy="831846"/>
+          </a:xfrm>
+          <a:prstGeom prst="straightConnector1">
+            <a:avLst/>
+          </a:prstGeom>
+          <a:ln>
+            <a:tailEnd type="triangle"/>
+          </a:ln>
+        </p:spPr>
+        <p:style>
+          <a:lnRef idx="2">
+            <a:schemeClr val="accent1"/>
+          </a:lnRef>
+          <a:fillRef idx="0">
+            <a:schemeClr val="accent1"/>
+          </a:fillRef>
+          <a:effectRef idx="1">
+            <a:schemeClr val="accent1"/>
+          </a:effectRef>
+          <a:fontRef idx="minor">
+            <a:schemeClr val="tx1"/>
+          </a:fontRef>
+        </p:style>
+      </p:cxnSp>
+      <p:cxnSp>
+        <p:nvCxnSpPr>
+          <p:cNvPr id="95" name="Straight Arrow Connector 94">
+            <a:extLst>
+              <a:ext uri="{FF2B5EF4-FFF2-40B4-BE49-F238E27FC236}">
+                <a16:creationId xmlns:a16="http://schemas.microsoft.com/office/drawing/2014/main" id="{A444B07B-1FCF-662D-28D1-7518D51D9191}"/>
+              </a:ext>
+            </a:extLst>
+          </p:cNvPr>
+          <p:cNvCxnSpPr>
+            <a:cxnSpLocks/>
+            <a:stCxn id="61" idx="2"/>
+            <a:endCxn id="87" idx="1"/>
+          </p:cNvCxnSpPr>
+          <p:nvPr/>
+        </p:nvCxnSpPr>
+        <p:spPr>
+          <a:xfrm flipH="1">
+            <a:off x="3953236" y="4409045"/>
+            <a:ext cx="674670" cy="831846"/>
+          </a:xfrm>
+          <a:prstGeom prst="straightConnector1">
+            <a:avLst/>
+          </a:prstGeom>
+          <a:ln>
+            <a:tailEnd type="triangle"/>
+          </a:ln>
+        </p:spPr>
+        <p:style>
+          <a:lnRef idx="2">
+            <a:schemeClr val="accent1"/>
+          </a:lnRef>
+          <a:fillRef idx="0">
+            <a:schemeClr val="accent1"/>
+          </a:fillRef>
+          <a:effectRef idx="1">
+            <a:schemeClr val="accent1"/>
+          </a:effectRef>
+          <a:fontRef idx="minor">
+            <a:schemeClr val="tx1"/>
+          </a:fontRef>
+        </p:style>
+      </p:cxnSp>
+    </p:spTree>
+    <p:extLst>
+      <p:ext uri="{BB962C8B-B14F-4D97-AF65-F5344CB8AC3E}">
+        <p14:creationId xmlns:p14="http://schemas.microsoft.com/office/powerpoint/2010/main" val="2211087421"/>
       </p:ext>
     </p:extLst>
   </p:cSld>
@@ -5443,4 +8001,319 @@
     </a:ext>
   </a:extLst>
 </a:theme>
+</file>
+
+<file path=ppt/theme/theme2.xml><?xml version="1.0" encoding="utf-8"?>
+<a:theme xmlns:a="http://schemas.openxmlformats.org/drawingml/2006/main" name="Office Theme">
+  <a:themeElements>
+    <a:clrScheme name="Office">
+      <a:dk1>
+        <a:sysClr val="windowText" lastClr="000000"/>
+      </a:dk1>
+      <a:lt1>
+        <a:sysClr val="window" lastClr="FFFFFF"/>
+      </a:lt1>
+      <a:dk2>
+        <a:srgbClr val="0E2841"/>
+      </a:dk2>
+      <a:lt2>
+        <a:srgbClr val="E8E8E8"/>
+      </a:lt2>
+      <a:accent1>
+        <a:srgbClr val="156082"/>
+      </a:accent1>
+      <a:accent2>
+        <a:srgbClr val="E97132"/>
+      </a:accent2>
+      <a:accent3>
+        <a:srgbClr val="196B24"/>
+      </a:accent3>
+      <a:accent4>
+        <a:srgbClr val="0F9ED5"/>
+      </a:accent4>
+      <a:accent5>
+        <a:srgbClr val="A02B93"/>
+      </a:accent5>
+      <a:accent6>
+        <a:srgbClr val="4EA72E"/>
+      </a:accent6>
+      <a:hlink>
+        <a:srgbClr val="467886"/>
+      </a:hlink>
+      <a:folHlink>
+        <a:srgbClr val="96607D"/>
+      </a:folHlink>
+    </a:clrScheme>
+    <a:fontScheme name="Office">
+      <a:majorFont>
+        <a:latin typeface="Aptos Display" panose="02110004020202020204"/>
+        <a:ea typeface=""/>
+        <a:cs typeface=""/>
+        <a:font script="Jpan" typeface="游ゴシック Light"/>
+        <a:font script="Hang" typeface="맑은 고딕"/>
+        <a:font script="Hans" typeface="等线 Light"/>
+        <a:font script="Hant" typeface="新細明體"/>
+        <a:font script="Arab" typeface="Times New Roman"/>
+        <a:font script="Hebr" typeface="Times New Roman"/>
+        <a:font script="Thai" typeface="Angsana New"/>
+        <a:font script="Ethi" typeface="Nyala"/>
+        <a:font script="Beng" typeface="Vrinda"/>
+        <a:font script="Gujr" typeface="Shruti"/>
+        <a:font script="Khmr" typeface="MoolBoran"/>
+        <a:font script="Knda" typeface="Tunga"/>
+        <a:font script="Guru" typeface="Raavi"/>
+        <a:font script="Cans" typeface="Euphemia"/>
+        <a:font script="Cher" typeface="Plantagenet Cherokee"/>
+        <a:font script="Yiii" typeface="Microsoft Yi Baiti"/>
+        <a:font script="Tibt" typeface="Microsoft Himalaya"/>
+        <a:font script="Thaa" typeface="MV Boli"/>
+        <a:font script="Deva" typeface="Mangal"/>
+        <a:font script="Telu" typeface="Gautami"/>
+        <a:font script="Taml" typeface="Latha"/>
+        <a:font script="Syrc" typeface="Estrangelo Edessa"/>
+        <a:font script="Orya" typeface="Kalinga"/>
+        <a:font script="Mlym" typeface="Kartika"/>
+        <a:font script="Laoo" typeface="DokChampa"/>
+        <a:font script="Sinh" typeface="Iskoola Pota"/>
+        <a:font script="Mong" typeface="Mongolian Baiti"/>
+        <a:font script="Viet" typeface="Times New Roman"/>
+        <a:font script="Uigh" typeface="Microsoft Uighur"/>
+        <a:font script="Geor" typeface="Sylfaen"/>
+        <a:font script="Armn" typeface="Arial"/>
+        <a:font script="Bugi" typeface="Leelawadee UI"/>
+        <a:font script="Bopo" typeface="Microsoft JhengHei"/>
+        <a:font script="Java" typeface="Javanese Text"/>
+        <a:font script="Lisu" typeface="Segoe UI"/>
+        <a:font script="Mymr" typeface="Myanmar Text"/>
+        <a:font script="Nkoo" typeface="Ebrima"/>
+        <a:font script="Olck" typeface="Nirmala UI"/>
+        <a:font script="Osma" typeface="Ebrima"/>
+        <a:font script="Phag" typeface="Phagspa"/>
+        <a:font script="Syrn" typeface="Estrangelo Edessa"/>
+        <a:font script="Syrj" typeface="Estrangelo Edessa"/>
+        <a:font script="Syre" typeface="Estrangelo Edessa"/>
+        <a:font script="Sora" typeface="Nirmala UI"/>
+        <a:font script="Tale" typeface="Microsoft Tai Le"/>
+        <a:font script="Talu" typeface="Microsoft New Tai Lue"/>
+        <a:font script="Tfng" typeface="Ebrima"/>
+      </a:majorFont>
+      <a:minorFont>
+        <a:latin typeface="Aptos" panose="02110004020202020204"/>
+        <a:ea typeface=""/>
+        <a:cs typeface=""/>
+        <a:font script="Jpan" typeface="游ゴシック"/>
+        <a:font script="Hang" typeface="맑은 고딕"/>
+        <a:font script="Hans" typeface="等线"/>
+        <a:font script="Hant" typeface="新細明體"/>
+        <a:font script="Arab" typeface="Arial"/>
+        <a:font script="Hebr" typeface="Arial"/>
+        <a:font script="Thai" typeface="Cordia New"/>
+        <a:font script="Ethi" typeface="Nyala"/>
+        <a:font script="Beng" typeface="Vrinda"/>
+        <a:font script="Gujr" typeface="Shruti"/>
+        <a:font script="Khmr" typeface="DaunPenh"/>
+        <a:font script="Knda" typeface="Tunga"/>
+        <a:font script="Guru" typeface="Raavi"/>
+        <a:font script="Cans" typeface="Euphemia"/>
+        <a:font script="Cher" typeface="Plantagenet Cherokee"/>
+        <a:font script="Yiii" typeface="Microsoft Yi Baiti"/>
+        <a:font script="Tibt" typeface="Microsoft Himalaya"/>
+        <a:font script="Thaa" typeface="MV Boli"/>
+        <a:font script="Deva" typeface="Mangal"/>
+        <a:font script="Telu" typeface="Gautami"/>
+        <a:font script="Taml" typeface="Latha"/>
+        <a:font script="Syrc" typeface="Estrangelo Edessa"/>
+        <a:font script="Orya" typeface="Kalinga"/>
+        <a:font script="Mlym" typeface="Kartika"/>
+        <a:font script="Laoo" typeface="DokChampa"/>
+        <a:font script="Sinh" typeface="Iskoola Pota"/>
+        <a:font script="Mong" typeface="Mongolian Baiti"/>
+        <a:font script="Viet" typeface="Arial"/>
+        <a:font script="Uigh" typeface="Microsoft Uighur"/>
+        <a:font script="Geor" typeface="Sylfaen"/>
+        <a:font script="Armn" typeface="Arial"/>
+        <a:font script="Bugi" typeface="Leelawadee UI"/>
+        <a:font script="Bopo" typeface="Microsoft JhengHei"/>
+        <a:font script="Java" typeface="Javanese Text"/>
+        <a:font script="Lisu" typeface="Segoe UI"/>
+        <a:font script="Mymr" typeface="Myanmar Text"/>
+        <a:font script="Nkoo" typeface="Ebrima"/>
+        <a:font script="Olck" typeface="Nirmala UI"/>
+        <a:font script="Osma" typeface="Ebrima"/>
+        <a:font script="Phag" typeface="Phagspa"/>
+        <a:font script="Syrn" typeface="Estrangelo Edessa"/>
+        <a:font script="Syrj" typeface="Estrangelo Edessa"/>
+        <a:font script="Syre" typeface="Estrangelo Edessa"/>
+        <a:font script="Sora" typeface="Nirmala UI"/>
+        <a:font script="Tale" typeface="Microsoft Tai Le"/>
+        <a:font script="Talu" typeface="Microsoft New Tai Lue"/>
+        <a:font script="Tfng" typeface="Ebrima"/>
+      </a:minorFont>
+    </a:fontScheme>
+    <a:fmtScheme name="Office">
+      <a:fillStyleLst>
+        <a:solidFill>
+          <a:schemeClr val="phClr"/>
+        </a:solidFill>
+        <a:gradFill rotWithShape="1">
+          <a:gsLst>
+            <a:gs pos="0">
+              <a:schemeClr val="phClr">
+                <a:lumMod val="110000"/>
+                <a:satMod val="105000"/>
+                <a:tint val="67000"/>
+              </a:schemeClr>
+            </a:gs>
+            <a:gs pos="50000">
+              <a:schemeClr val="phClr">
+                <a:lumMod val="105000"/>
+                <a:satMod val="103000"/>
+                <a:tint val="73000"/>
+              </a:schemeClr>
+            </a:gs>
+            <a:gs pos="100000">
+              <a:schemeClr val="phClr">
+                <a:lumMod val="105000"/>
+                <a:satMod val="109000"/>
+                <a:tint val="81000"/>
+              </a:schemeClr>
+            </a:gs>
+          </a:gsLst>
+          <a:lin ang="5400000" scaled="0"/>
+        </a:gradFill>
+        <a:gradFill rotWithShape="1">
+          <a:gsLst>
+            <a:gs pos="0">
+              <a:schemeClr val="phClr">
+                <a:satMod val="103000"/>
+                <a:lumMod val="102000"/>
+                <a:tint val="94000"/>
+              </a:schemeClr>
+            </a:gs>
+            <a:gs pos="50000">
+              <a:schemeClr val="phClr">
+                <a:satMod val="110000"/>
+                <a:lumMod val="100000"/>
+                <a:shade val="100000"/>
+              </a:schemeClr>
+            </a:gs>
+            <a:gs pos="100000">
+              <a:schemeClr val="phClr">
+                <a:lumMod val="99000"/>
+                <a:satMod val="120000"/>
+                <a:shade val="78000"/>
+              </a:schemeClr>
+            </a:gs>
+          </a:gsLst>
+          <a:lin ang="5400000" scaled="0"/>
+        </a:gradFill>
+      </a:fillStyleLst>
+      <a:lnStyleLst>
+        <a:ln w="12700" cap="flat" cmpd="sng" algn="ctr">
+          <a:solidFill>
+            <a:schemeClr val="phClr"/>
+          </a:solidFill>
+          <a:prstDash val="solid"/>
+          <a:miter lim="800000"/>
+        </a:ln>
+        <a:ln w="19050" cap="flat" cmpd="sng" algn="ctr">
+          <a:solidFill>
+            <a:schemeClr val="phClr"/>
+          </a:solidFill>
+          <a:prstDash val="solid"/>
+          <a:miter lim="800000"/>
+        </a:ln>
+        <a:ln w="25400" cap="flat" cmpd="sng" algn="ctr">
+          <a:solidFill>
+            <a:schemeClr val="phClr"/>
+          </a:solidFill>
+          <a:prstDash val="solid"/>
+          <a:miter lim="800000"/>
+        </a:ln>
+      </a:lnStyleLst>
+      <a:effectStyleLst>
+        <a:effectStyle>
+          <a:effectLst/>
+        </a:effectStyle>
+        <a:effectStyle>
+          <a:effectLst/>
+        </a:effectStyle>
+        <a:effectStyle>
+          <a:effectLst>
+            <a:outerShdw blurRad="57150" dist="19050" dir="5400000" algn="ctr" rotWithShape="0">
+              <a:srgbClr val="000000">
+                <a:alpha val="63000"/>
+              </a:srgbClr>
+            </a:outerShdw>
+          </a:effectLst>
+        </a:effectStyle>
+      </a:effectStyleLst>
+      <a:bgFillStyleLst>
+        <a:solidFill>
+          <a:schemeClr val="phClr"/>
+        </a:solidFill>
+        <a:solidFill>
+          <a:schemeClr val="phClr">
+            <a:tint val="95000"/>
+            <a:satMod val="170000"/>
+          </a:schemeClr>
+        </a:solidFill>
+        <a:gradFill rotWithShape="1">
+          <a:gsLst>
+            <a:gs pos="0">
+              <a:schemeClr val="phClr">
+                <a:tint val="93000"/>
+                <a:satMod val="150000"/>
+                <a:shade val="98000"/>
+                <a:lumMod val="102000"/>
+              </a:schemeClr>
+            </a:gs>
+            <a:gs pos="50000">
+              <a:schemeClr val="phClr">
+                <a:tint val="98000"/>
+                <a:satMod val="130000"/>
+                <a:shade val="90000"/>
+                <a:lumMod val="103000"/>
+              </a:schemeClr>
+            </a:gs>
+            <a:gs pos="100000">
+              <a:schemeClr val="phClr">
+                <a:shade val="63000"/>
+                <a:satMod val="120000"/>
+              </a:schemeClr>
+            </a:gs>
+          </a:gsLst>
+          <a:lin ang="5400000" scaled="0"/>
+        </a:gradFill>
+      </a:bgFillStyleLst>
+    </a:fmtScheme>
+  </a:themeElements>
+  <a:objectDefaults>
+    <a:lnDef>
+      <a:spPr/>
+      <a:bodyPr/>
+      <a:lstStyle/>
+      <a:style>
+        <a:lnRef idx="2">
+          <a:schemeClr val="accent1"/>
+        </a:lnRef>
+        <a:fillRef idx="0">
+          <a:schemeClr val="accent1"/>
+        </a:fillRef>
+        <a:effectRef idx="1">
+          <a:schemeClr val="accent1"/>
+        </a:effectRef>
+        <a:fontRef idx="minor">
+          <a:schemeClr val="tx1"/>
+        </a:fontRef>
+      </a:style>
+    </a:lnDef>
+  </a:objectDefaults>
+  <a:extraClrSchemeLst/>
+  <a:extLst>
+    <a:ext uri="{05A4C25C-085E-4340-85A3-A5531E510DB2}">
+      <thm15:themeFamily xmlns:thm15="http://schemas.microsoft.com/office/thememl/2012/main" name="Office Theme" id="{2E142A2C-CD16-42D6-873A-C26D2A0506FA}" vid="{1BDDFF52-6CD6-40A5-AB3C-68EB2F1E4D0A}"/>
+    </a:ext>
+  </a:extLst>
+</a:theme>
 </file>
</xml_diff>